<commit_message>
SW skills quiz, and ideas for Lab
</commit_message>
<xml_diff>
--- a/sw_skills/sw_skills.pptx
+++ b/sw_skills/sw_skills.pptx
@@ -20,6 +20,10 @@
     <p:sldId id="265" r:id="rId17"/>
     <p:sldId id="266" r:id="rId18"/>
     <p:sldId id="267" r:id="rId19"/>
+    <p:sldId id="268" r:id="rId20"/>
+    <p:sldId id="269" r:id="rId21"/>
+    <p:sldId id="270" r:id="rId22"/>
+    <p:sldId id="271" r:id="rId23"/>
   </p:sldIdLst>
   <p:sldSz cx="9144000" cy="5143500"/>
   <p:notesSz cx="6858000" cy="9144000"/>
@@ -74,10 +78,10 @@
         </a:solidFill>
         <a:effectLst/>
         <a:uFillTx/>
-        <a:latin typeface="+mj-lt"/>
-        <a:ea typeface="+mj-ea"/>
-        <a:cs typeface="+mj-cs"/>
-        <a:sym typeface="Arial"/>
+        <a:latin typeface="+mn-lt"/>
+        <a:ea typeface="+mn-ea"/>
+        <a:cs typeface="+mn-cs"/>
+        <a:sym typeface="Helvetica"/>
       </a:defRPr>
     </a:lvl1pPr>
     <a:lvl2pPr marL="0" marR="0" indent="0" algn="l" defTabSz="914400" rtl="0" fontAlgn="auto" latinLnBrk="0" hangingPunct="0">
@@ -104,10 +108,10 @@
         </a:solidFill>
         <a:effectLst/>
         <a:uFillTx/>
-        <a:latin typeface="+mj-lt"/>
-        <a:ea typeface="+mj-ea"/>
-        <a:cs typeface="+mj-cs"/>
-        <a:sym typeface="Arial"/>
+        <a:latin typeface="+mn-lt"/>
+        <a:ea typeface="+mn-ea"/>
+        <a:cs typeface="+mn-cs"/>
+        <a:sym typeface="Helvetica"/>
       </a:defRPr>
     </a:lvl2pPr>
     <a:lvl3pPr marL="0" marR="0" indent="0" algn="l" defTabSz="914400" rtl="0" fontAlgn="auto" latinLnBrk="0" hangingPunct="0">
@@ -134,10 +138,10 @@
         </a:solidFill>
         <a:effectLst/>
         <a:uFillTx/>
-        <a:latin typeface="+mj-lt"/>
-        <a:ea typeface="+mj-ea"/>
-        <a:cs typeface="+mj-cs"/>
-        <a:sym typeface="Arial"/>
+        <a:latin typeface="+mn-lt"/>
+        <a:ea typeface="+mn-ea"/>
+        <a:cs typeface="+mn-cs"/>
+        <a:sym typeface="Helvetica"/>
       </a:defRPr>
     </a:lvl3pPr>
     <a:lvl4pPr marL="0" marR="0" indent="0" algn="l" defTabSz="914400" rtl="0" fontAlgn="auto" latinLnBrk="0" hangingPunct="0">
@@ -164,10 +168,10 @@
         </a:solidFill>
         <a:effectLst/>
         <a:uFillTx/>
-        <a:latin typeface="+mj-lt"/>
-        <a:ea typeface="+mj-ea"/>
-        <a:cs typeface="+mj-cs"/>
-        <a:sym typeface="Arial"/>
+        <a:latin typeface="+mn-lt"/>
+        <a:ea typeface="+mn-ea"/>
+        <a:cs typeface="+mn-cs"/>
+        <a:sym typeface="Helvetica"/>
       </a:defRPr>
     </a:lvl4pPr>
     <a:lvl5pPr marL="0" marR="0" indent="0" algn="l" defTabSz="914400" rtl="0" fontAlgn="auto" latinLnBrk="0" hangingPunct="0">
@@ -194,10 +198,10 @@
         </a:solidFill>
         <a:effectLst/>
         <a:uFillTx/>
-        <a:latin typeface="+mj-lt"/>
-        <a:ea typeface="+mj-ea"/>
-        <a:cs typeface="+mj-cs"/>
-        <a:sym typeface="Arial"/>
+        <a:latin typeface="+mn-lt"/>
+        <a:ea typeface="+mn-ea"/>
+        <a:cs typeface="+mn-cs"/>
+        <a:sym typeface="Helvetica"/>
       </a:defRPr>
     </a:lvl5pPr>
     <a:lvl6pPr marL="0" marR="0" indent="0" algn="l" defTabSz="914400" rtl="0" fontAlgn="auto" latinLnBrk="0" hangingPunct="0">
@@ -224,10 +228,10 @@
         </a:solidFill>
         <a:effectLst/>
         <a:uFillTx/>
-        <a:latin typeface="+mj-lt"/>
-        <a:ea typeface="+mj-ea"/>
-        <a:cs typeface="+mj-cs"/>
-        <a:sym typeface="Arial"/>
+        <a:latin typeface="+mn-lt"/>
+        <a:ea typeface="+mn-ea"/>
+        <a:cs typeface="+mn-cs"/>
+        <a:sym typeface="Helvetica"/>
       </a:defRPr>
     </a:lvl6pPr>
     <a:lvl7pPr marL="0" marR="0" indent="0" algn="l" defTabSz="914400" rtl="0" fontAlgn="auto" latinLnBrk="0" hangingPunct="0">
@@ -254,10 +258,10 @@
         </a:solidFill>
         <a:effectLst/>
         <a:uFillTx/>
-        <a:latin typeface="+mj-lt"/>
-        <a:ea typeface="+mj-ea"/>
-        <a:cs typeface="+mj-cs"/>
-        <a:sym typeface="Arial"/>
+        <a:latin typeface="+mn-lt"/>
+        <a:ea typeface="+mn-ea"/>
+        <a:cs typeface="+mn-cs"/>
+        <a:sym typeface="Helvetica"/>
       </a:defRPr>
     </a:lvl7pPr>
     <a:lvl8pPr marL="0" marR="0" indent="0" algn="l" defTabSz="914400" rtl="0" fontAlgn="auto" latinLnBrk="0" hangingPunct="0">
@@ -284,10 +288,10 @@
         </a:solidFill>
         <a:effectLst/>
         <a:uFillTx/>
-        <a:latin typeface="+mj-lt"/>
-        <a:ea typeface="+mj-ea"/>
-        <a:cs typeface="+mj-cs"/>
-        <a:sym typeface="Arial"/>
+        <a:latin typeface="+mn-lt"/>
+        <a:ea typeface="+mn-ea"/>
+        <a:cs typeface="+mn-cs"/>
+        <a:sym typeface="Helvetica"/>
       </a:defRPr>
     </a:lvl8pPr>
     <a:lvl9pPr marL="0" marR="0" indent="0" algn="l" defTabSz="914400" rtl="0" fontAlgn="auto" latinLnBrk="0" hangingPunct="0">
@@ -314,10 +318,10 @@
         </a:solidFill>
         <a:effectLst/>
         <a:uFillTx/>
-        <a:latin typeface="+mj-lt"/>
-        <a:ea typeface="+mj-ea"/>
-        <a:cs typeface="+mj-cs"/>
-        <a:sym typeface="Arial"/>
+        <a:latin typeface="+mn-lt"/>
+        <a:ea typeface="+mn-ea"/>
+        <a:cs typeface="+mn-cs"/>
+        <a:sym typeface="Helvetica"/>
       </a:defRPr>
     </a:lvl9pPr>
   </p:defaultTextStyle>
@@ -502,8 +506,8 @@
         </p:nvSpPr>
         <p:spPr>
           <a:xfrm>
-            <a:off x="311708" y="744574"/>
-            <a:ext cx="8520601" cy="2052601"/>
+            <a:off x="311708" y="744573"/>
+            <a:ext cx="8520601" cy="2052603"/>
           </a:xfrm>
           <a:prstGeom prst="rect">
             <a:avLst/>
@@ -534,8 +538,8 @@
         </p:nvSpPr>
         <p:spPr>
           <a:xfrm>
-            <a:off x="311699" y="2834125"/>
-            <a:ext cx="8520602" cy="792601"/>
+            <a:off x="311698" y="2834125"/>
+            <a:ext cx="8520603" cy="792602"/>
           </a:xfrm>
           <a:prstGeom prst="rect">
             <a:avLst/>
@@ -544,7 +548,7 @@
         <p:txBody>
           <a:bodyPr/>
           <a:lstStyle>
-            <a:lvl1pPr marL="342900" indent="-228600" algn="ctr">
+            <a:lvl1pPr marL="228600" indent="-114300" algn="ctr">
               <a:lnSpc>
                 <a:spcPct val="100000"/>
               </a:lnSpc>
@@ -554,7 +558,7 @@
               <a:buNone/>
               <a:defRPr sz="2800"/>
             </a:lvl1pPr>
-            <a:lvl2pPr marL="342900" indent="254000" algn="ctr">
+            <a:lvl2pPr marL="228600" indent="114300" algn="ctr">
               <a:lnSpc>
                 <a:spcPct val="100000"/>
               </a:lnSpc>
@@ -564,7 +568,7 @@
               <a:buNone/>
               <a:defRPr sz="2800"/>
             </a:lvl2pPr>
-            <a:lvl3pPr marL="342900" indent="711200" algn="ctr">
+            <a:lvl3pPr marL="228600" indent="114300" algn="ctr">
               <a:lnSpc>
                 <a:spcPct val="100000"/>
               </a:lnSpc>
@@ -574,7 +578,7 @@
               <a:buNone/>
               <a:defRPr sz="2800"/>
             </a:lvl3pPr>
-            <a:lvl4pPr marL="342900" indent="1168400" algn="ctr">
+            <a:lvl4pPr marL="228600" indent="114300" algn="ctr">
               <a:lnSpc>
                 <a:spcPct val="100000"/>
               </a:lnSpc>
@@ -584,7 +588,7 @@
               <a:buNone/>
               <a:defRPr sz="2800"/>
             </a:lvl4pPr>
-            <a:lvl5pPr marL="342900" indent="1625600" algn="ctr">
+            <a:lvl5pPr marL="228600" indent="114300" algn="ctr">
               <a:lnSpc>
                 <a:spcPct val="100000"/>
               </a:lnSpc>
@@ -685,8 +689,8 @@
         </p:nvSpPr>
         <p:spPr>
           <a:xfrm>
-            <a:off x="311699" y="1106125"/>
-            <a:ext cx="8520602" cy="1963500"/>
+            <a:off x="311698" y="1106125"/>
+            <a:ext cx="8520603" cy="1963500"/>
           </a:xfrm>
           <a:prstGeom prst="rect">
             <a:avLst/>
@@ -717,8 +721,8 @@
         </p:nvSpPr>
         <p:spPr>
           <a:xfrm>
-            <a:off x="311699" y="3152225"/>
-            <a:ext cx="8520602" cy="1300800"/>
+            <a:off x="311698" y="3152225"/>
+            <a:ext cx="8520603" cy="1300800"/>
           </a:xfrm>
           <a:prstGeom prst="rect">
             <a:avLst/>
@@ -872,7 +876,7 @@
         <p:spPr>
           <a:xfrm>
             <a:off x="4279493" y="865960"/>
-            <a:ext cx="4275422" cy="1576114"/>
+            <a:ext cx="4275423" cy="1576115"/>
           </a:xfrm>
           <a:prstGeom prst="rect">
             <a:avLst/>
@@ -914,8 +918,8 @@
         </p:nvSpPr>
         <p:spPr>
           <a:xfrm>
-            <a:off x="-1" y="1229329"/>
-            <a:ext cx="4448278" cy="4450502"/>
+            <a:off x="-2" y="1229329"/>
+            <a:ext cx="4448280" cy="4450503"/>
           </a:xfrm>
           <a:prstGeom prst="rect">
             <a:avLst/>
@@ -939,8 +943,8 @@
         </p:nvSpPr>
         <p:spPr>
           <a:xfrm>
-            <a:off x="3879358" y="972009"/>
-            <a:ext cx="257323" cy="257323"/>
+            <a:off x="3879358" y="972008"/>
+            <a:ext cx="257325" cy="257325"/>
           </a:xfrm>
           <a:prstGeom prst="ellipse">
             <a:avLst/>
@@ -978,8 +982,8 @@
         </p:nvSpPr>
         <p:spPr>
           <a:xfrm flipH="1" flipV="1">
-            <a:off x="4210884" y="2690754"/>
-            <a:ext cx="1970109" cy="1"/>
+            <a:off x="4210884" y="2690753"/>
+            <a:ext cx="1970110" cy="2"/>
           </a:xfrm>
           <a:prstGeom prst="line">
             <a:avLst/>
@@ -993,7 +997,7 @@
           </a:ln>
         </p:spPr>
         <p:txBody>
-          <a:bodyPr lIns="0" tIns="0" rIns="0" bIns="0"/>
+          <a:bodyPr lIns="45718" tIns="45718" rIns="45718" bIns="45718"/>
           <a:lstStyle/>
           <a:p>
             <a:pPr/>
@@ -1011,7 +1015,7 @@
         <p:spPr>
           <a:xfrm>
             <a:off x="5129486" y="2760782"/>
-            <a:ext cx="2831034" cy="2073111"/>
+            <a:ext cx="2831035" cy="2073112"/>
           </a:xfrm>
           <a:prstGeom prst="rect">
             <a:avLst/>
@@ -1020,7 +1024,7 @@
         <p:txBody>
           <a:bodyPr lIns="0" tIns="0" rIns="0" bIns="0"/>
           <a:lstStyle>
-            <a:lvl1pPr marL="228600" indent="0">
+            <a:lvl1pPr marL="0" indent="228600">
               <a:lnSpc>
                 <a:spcPct val="100000"/>
               </a:lnSpc>
@@ -1038,7 +1042,7 @@
                 <a:sym typeface="Libre Franklin"/>
               </a:defRPr>
             </a:lvl1pPr>
-            <a:lvl2pPr marL="228600" indent="457200">
+            <a:lvl2pPr marL="0" indent="228600">
               <a:lnSpc>
                 <a:spcPct val="100000"/>
               </a:lnSpc>
@@ -1056,7 +1060,7 @@
                 <a:sym typeface="Libre Franklin"/>
               </a:defRPr>
             </a:lvl2pPr>
-            <a:lvl3pPr marL="1501139" indent="-453389">
+            <a:lvl3pPr marL="1501138" indent="-453388">
               <a:lnSpc>
                 <a:spcPct val="100000"/>
               </a:lnSpc>
@@ -1151,8 +1155,8 @@
         </p:nvSpPr>
         <p:spPr>
           <a:xfrm>
-            <a:off x="8941552" y="650631"/>
-            <a:ext cx="202448" cy="4246679"/>
+            <a:off x="8941551" y="650630"/>
+            <a:ext cx="202449" cy="4246681"/>
           </a:xfrm>
           <a:prstGeom prst="rect">
             <a:avLst/>
@@ -1192,8 +1196,8 @@
         </p:nvSpPr>
         <p:spPr>
           <a:xfrm>
-            <a:off x="4419600" y="4608064"/>
-            <a:ext cx="2133600" cy="318397"/>
+            <a:off x="6216389" y="4608065"/>
+            <a:ext cx="336812" cy="318395"/>
           </a:xfrm>
           <a:prstGeom prst="rect">
             <a:avLst/>
@@ -1286,7 +1290,7 @@
         <p:spPr>
           <a:xfrm>
             <a:off x="713988" y="741094"/>
-            <a:ext cx="279699" cy="279699"/>
+            <a:ext cx="279700" cy="279700"/>
           </a:xfrm>
           <a:prstGeom prst="rect">
             <a:avLst/>
@@ -1326,8 +1330,8 @@
         </p:nvSpPr>
         <p:spPr>
           <a:xfrm>
-            <a:off x="1138914" y="1312258"/>
-            <a:ext cx="7311109" cy="3528150"/>
+            <a:off x="1138914" y="1312257"/>
+            <a:ext cx="7311109" cy="3528152"/>
           </a:xfrm>
           <a:prstGeom prst="rect">
             <a:avLst/>
@@ -1356,7 +1360,7 @@
                 <a:sym typeface="Libre Franklin"/>
               </a:defRPr>
             </a:lvl1pPr>
-            <a:lvl2pPr marL="993588" indent="-415738">
+            <a:lvl2pPr marL="993587" indent="-415737">
               <a:lnSpc>
                 <a:spcPct val="95000"/>
               </a:lnSpc>
@@ -1376,7 +1380,7 @@
                 <a:sym typeface="Libre Franklin"/>
               </a:defRPr>
             </a:lvl2pPr>
-            <a:lvl3pPr marL="1501139" indent="-453389">
+            <a:lvl3pPr marL="1501138" indent="-453388">
               <a:lnSpc>
                 <a:spcPct val="95000"/>
               </a:lnSpc>
@@ -1479,8 +1483,8 @@
         </p:nvSpPr>
         <p:spPr>
           <a:xfrm>
-            <a:off x="4419600" y="4608064"/>
-            <a:ext cx="2133600" cy="318397"/>
+            <a:off x="6216389" y="4608065"/>
+            <a:ext cx="336812" cy="318395"/>
           </a:xfrm>
           <a:prstGeom prst="rect">
             <a:avLst/>
@@ -1540,7 +1544,7 @@
         <p:spPr>
           <a:xfrm>
             <a:off x="9605233" y="1373281"/>
-            <a:ext cx="228601" cy="1428751"/>
+            <a:ext cx="228602" cy="1428751"/>
           </a:xfrm>
           <a:prstGeom prst="rect">
             <a:avLst/>
@@ -1631,7 +1635,7 @@
         <p:spPr>
           <a:xfrm>
             <a:off x="713988" y="741094"/>
-            <a:ext cx="279699" cy="279699"/>
+            <a:ext cx="279700" cy="279700"/>
           </a:xfrm>
           <a:prstGeom prst="rect">
             <a:avLst/>
@@ -1671,8 +1675,8 @@
         </p:nvSpPr>
         <p:spPr>
           <a:xfrm>
-            <a:off x="1138914" y="1312258"/>
-            <a:ext cx="7311109" cy="3528150"/>
+            <a:off x="1138914" y="1312257"/>
+            <a:ext cx="7311109" cy="3528152"/>
           </a:xfrm>
           <a:prstGeom prst="rect">
             <a:avLst/>
@@ -1701,7 +1705,7 @@
                 <a:sym typeface="Libre Franklin"/>
               </a:defRPr>
             </a:lvl1pPr>
-            <a:lvl2pPr marL="993588" indent="-415738">
+            <a:lvl2pPr marL="993587" indent="-415737">
               <a:lnSpc>
                 <a:spcPct val="95000"/>
               </a:lnSpc>
@@ -1721,7 +1725,7 @@
                 <a:sym typeface="Libre Franklin"/>
               </a:defRPr>
             </a:lvl2pPr>
-            <a:lvl3pPr marL="1501139" indent="-453389">
+            <a:lvl3pPr marL="1501138" indent="-453388">
               <a:lnSpc>
                 <a:spcPct val="95000"/>
               </a:lnSpc>
@@ -1824,8 +1828,8 @@
         </p:nvSpPr>
         <p:spPr>
           <a:xfrm>
-            <a:off x="4419600" y="4608064"/>
-            <a:ext cx="2133600" cy="318397"/>
+            <a:off x="6216389" y="4608065"/>
+            <a:ext cx="336812" cy="318395"/>
           </a:xfrm>
           <a:prstGeom prst="rect">
             <a:avLst/>
@@ -1885,7 +1889,7 @@
         <p:spPr>
           <a:xfrm>
             <a:off x="9605233" y="1373281"/>
-            <a:ext cx="228601" cy="1428751"/>
+            <a:ext cx="228602" cy="1428751"/>
           </a:xfrm>
           <a:prstGeom prst="rect">
             <a:avLst/>
@@ -1935,7 +1939,7 @@
         <p:spPr>
           <a:xfrm>
             <a:off x="1138914" y="708157"/>
-            <a:ext cx="6858001" cy="675057"/>
+            <a:ext cx="6858001" cy="675058"/>
           </a:xfrm>
           <a:prstGeom prst="rect">
             <a:avLst/>
@@ -1975,8 +1979,8 @@
         </p:nvSpPr>
         <p:spPr>
           <a:xfrm>
-            <a:off x="713988" y="734876"/>
-            <a:ext cx="279699" cy="279699"/>
+            <a:off x="713988" y="734875"/>
+            <a:ext cx="279700" cy="279700"/>
           </a:xfrm>
           <a:prstGeom prst="rect">
             <a:avLst/>
@@ -2016,8 +2020,8 @@
         </p:nvSpPr>
         <p:spPr>
           <a:xfrm>
-            <a:off x="1138914" y="1306042"/>
-            <a:ext cx="7311109" cy="3528150"/>
+            <a:off x="1138914" y="1306041"/>
+            <a:ext cx="7311109" cy="3528152"/>
           </a:xfrm>
           <a:prstGeom prst="rect">
             <a:avLst/>
@@ -2026,7 +2030,7 @@
         <p:txBody>
           <a:bodyPr lIns="0" tIns="0" rIns="0" bIns="0"/>
           <a:lstStyle>
-            <a:lvl1pPr marL="228600" indent="0">
+            <a:lvl1pPr marL="0" indent="228600">
               <a:lnSpc>
                 <a:spcPct val="140000"/>
               </a:lnSpc>
@@ -2044,7 +2048,7 @@
                 <a:sym typeface="Libre Franklin"/>
               </a:defRPr>
             </a:lvl1pPr>
-            <a:lvl2pPr marL="228600" indent="457200">
+            <a:lvl2pPr marL="0" indent="228600">
               <a:lnSpc>
                 <a:spcPct val="140000"/>
               </a:lnSpc>
@@ -2062,7 +2066,7 @@
                 <a:sym typeface="Libre Franklin"/>
               </a:defRPr>
             </a:lvl2pPr>
-            <a:lvl3pPr marL="1501139" indent="-453389">
+            <a:lvl3pPr marL="1501138" indent="-453388">
               <a:lnSpc>
                 <a:spcPct val="140000"/>
               </a:lnSpc>
@@ -2159,8 +2163,8 @@
         </p:nvSpPr>
         <p:spPr>
           <a:xfrm>
-            <a:off x="4419600" y="4608064"/>
-            <a:ext cx="2133600" cy="318397"/>
+            <a:off x="6216389" y="4608065"/>
+            <a:ext cx="336812" cy="318395"/>
           </a:xfrm>
           <a:prstGeom prst="rect">
             <a:avLst/>
@@ -2220,7 +2224,7 @@
         <p:spPr>
           <a:xfrm>
             <a:off x="9605233" y="1373281"/>
-            <a:ext cx="228601" cy="1428751"/>
+            <a:ext cx="228602" cy="1428751"/>
           </a:xfrm>
           <a:prstGeom prst="rect">
             <a:avLst/>
@@ -2299,7 +2303,7 @@
                 <a:sym typeface="Libre Franklin"/>
               </a:defRPr>
             </a:lvl1pPr>
-            <a:lvl2pPr marL="993588" indent="-415738">
+            <a:lvl2pPr marL="993587" indent="-415737">
               <a:lnSpc>
                 <a:spcPct val="95000"/>
               </a:lnSpc>
@@ -2319,7 +2323,7 @@
                 <a:sym typeface="Libre Franklin"/>
               </a:defRPr>
             </a:lvl2pPr>
-            <a:lvl3pPr marL="1501139" indent="-453389">
+            <a:lvl3pPr marL="1501138" indent="-453388">
               <a:lnSpc>
                 <a:spcPct val="95000"/>
               </a:lnSpc>
@@ -2422,8 +2426,8 @@
         </p:nvSpPr>
         <p:spPr>
           <a:xfrm>
-            <a:off x="4419600" y="4608064"/>
-            <a:ext cx="2133600" cy="318397"/>
+            <a:off x="6216389" y="4608065"/>
+            <a:ext cx="336812" cy="318395"/>
           </a:xfrm>
           <a:prstGeom prst="rect">
             <a:avLst/>
@@ -2483,7 +2487,7 @@
         <p:spPr>
           <a:xfrm>
             <a:off x="9605233" y="1373281"/>
-            <a:ext cx="228601" cy="1428751"/>
+            <a:ext cx="228602" cy="1428751"/>
           </a:xfrm>
           <a:prstGeom prst="rect">
             <a:avLst/>
@@ -2574,7 +2578,7 @@
         <p:spPr>
           <a:xfrm>
             <a:off x="705308" y="726195"/>
-            <a:ext cx="279699" cy="279699"/>
+            <a:ext cx="279700" cy="279700"/>
           </a:xfrm>
           <a:prstGeom prst="rect">
             <a:avLst/>
@@ -2615,7 +2619,7 @@
         <p:spPr>
           <a:xfrm>
             <a:off x="7296342" y="1242625"/>
-            <a:ext cx="1558292" cy="3592701"/>
+            <a:ext cx="1558293" cy="3592701"/>
           </a:xfrm>
           <a:prstGeom prst="rect">
             <a:avLst/>
@@ -2624,7 +2628,7 @@
         <p:txBody>
           <a:bodyPr lIns="0" tIns="0" rIns="0" bIns="0" anchor="ctr"/>
           <a:lstStyle>
-            <a:lvl1pPr marL="228600" indent="0">
+            <a:lvl1pPr marL="0" indent="228600">
               <a:lnSpc>
                 <a:spcPct val="100000"/>
               </a:lnSpc>
@@ -2678,7 +2682,7 @@
                 <a:sym typeface="Libre Franklin"/>
               </a:defRPr>
             </a:lvl3pPr>
-            <a:lvl4pPr marL="1896835" indent="-385535">
+            <a:lvl4pPr marL="1896834" indent="-385534">
               <a:lnSpc>
                 <a:spcPct val="100000"/>
               </a:lnSpc>
@@ -2696,7 +2700,7 @@
                 <a:sym typeface="Libre Franklin"/>
               </a:defRPr>
             </a:lvl4pPr>
-            <a:lvl5pPr marL="2354035" indent="-385535">
+            <a:lvl5pPr marL="2354034" indent="-385534">
               <a:lnSpc>
                 <a:spcPct val="100000"/>
               </a:lnSpc>
@@ -2755,8 +2759,8 @@
         </p:nvSpPr>
         <p:spPr>
           <a:xfrm>
-            <a:off x="7155301" y="1250065"/>
-            <a:ext cx="1" cy="3922621"/>
+            <a:off x="7155301" y="1250064"/>
+            <a:ext cx="2" cy="3922623"/>
           </a:xfrm>
           <a:prstGeom prst="line">
             <a:avLst/>
@@ -2770,7 +2774,7 @@
           </a:ln>
         </p:spPr>
         <p:txBody>
-          <a:bodyPr lIns="0" tIns="0" rIns="0" bIns="0"/>
+          <a:bodyPr lIns="45718" tIns="45718" rIns="45718" bIns="45718"/>
           <a:lstStyle/>
           <a:p>
             <a:pPr/>
@@ -2787,8 +2791,8 @@
         </p:nvSpPr>
         <p:spPr>
           <a:xfrm>
-            <a:off x="4419600" y="4608064"/>
-            <a:ext cx="2133600" cy="318397"/>
+            <a:off x="6216389" y="4608065"/>
+            <a:ext cx="336812" cy="318395"/>
           </a:xfrm>
           <a:prstGeom prst="rect">
             <a:avLst/>
@@ -2848,7 +2852,7 @@
         <p:spPr>
           <a:xfrm>
             <a:off x="9605233" y="1373281"/>
-            <a:ext cx="228601" cy="1428751"/>
+            <a:ext cx="228602" cy="1428751"/>
           </a:xfrm>
           <a:prstGeom prst="rect">
             <a:avLst/>
@@ -2907,7 +2911,7 @@
         <p:txBody>
           <a:bodyPr lIns="0" tIns="0" rIns="0" bIns="0" anchor="b"/>
           <a:lstStyle>
-            <a:lvl1pPr marL="228600" indent="0">
+            <a:lvl1pPr marL="0" indent="228600">
               <a:lnSpc>
                 <a:spcPct val="100000"/>
               </a:lnSpc>
@@ -2961,7 +2965,7 @@
                 <a:sym typeface="Franklin Gothic"/>
               </a:defRPr>
             </a:lvl3pPr>
-            <a:lvl4pPr marL="1896835" indent="-385535">
+            <a:lvl4pPr marL="1896834" indent="-385534">
               <a:lnSpc>
                 <a:spcPct val="100000"/>
               </a:lnSpc>
@@ -2979,7 +2983,7 @@
                 <a:sym typeface="Franklin Gothic"/>
               </a:defRPr>
             </a:lvl4pPr>
-            <a:lvl5pPr marL="2354035" indent="-385535">
+            <a:lvl5pPr marL="2354034" indent="-385534">
               <a:lnSpc>
                 <a:spcPct val="100000"/>
               </a:lnSpc>
@@ -3082,8 +3086,8 @@
         </p:nvSpPr>
         <p:spPr>
           <a:xfrm>
-            <a:off x="846821" y="876994"/>
-            <a:ext cx="4922435" cy="3811192"/>
+            <a:off x="846821" y="876993"/>
+            <a:ext cx="4922435" cy="3811194"/>
           </a:xfrm>
           <a:prstGeom prst="rect">
             <a:avLst/>
@@ -3093,27 +3097,7 @@
           <a:bodyPr lIns="34275" tIns="34275" rIns="34275" bIns="34275"/>
           <a:lstStyle/>
           <a:p>
-            <a:pPr marL="228600" indent="0" algn="ctr">
-              <a:lnSpc>
-                <a:spcPct val="90000"/>
-              </a:lnSpc>
-              <a:spcBef>
-                <a:spcPts val="800"/>
-              </a:spcBef>
-              <a:buClrTx/>
-              <a:buSzTx/>
-              <a:buFontTx/>
-              <a:buNone/>
-              <a:defRPr b="1" sz="4100">
-                <a:solidFill>
-                  <a:srgbClr val="4EC8D1"/>
-                </a:solidFill>
-                <a:latin typeface="Franklin Gothic"/>
-                <a:ea typeface="Franklin Gothic"/>
-                <a:cs typeface="Franklin Gothic"/>
-                <a:sym typeface="Franklin Gothic"/>
-              </a:defRPr>
-            </a:pPr>
+            <a:pPr/>
           </a:p>
         </p:txBody>
       </p:sp>
@@ -3128,7 +3112,7 @@
         <p:spPr>
           <a:xfrm>
             <a:off x="5898748" y="1172479"/>
-            <a:ext cx="1536541" cy="1536541"/>
+            <a:ext cx="1536542" cy="1536542"/>
           </a:xfrm>
           <a:prstGeom prst="rect">
             <a:avLst/>
@@ -3154,8 +3138,8 @@
         </p:nvSpPr>
         <p:spPr>
           <a:xfrm>
-            <a:off x="6858000" y="3500166"/>
-            <a:ext cx="2048719" cy="842060"/>
+            <a:off x="6858000" y="3500165"/>
+            <a:ext cx="2048719" cy="842061"/>
           </a:xfrm>
           <a:prstGeom prst="rect">
             <a:avLst/>
@@ -3165,24 +3149,7 @@
           <a:bodyPr lIns="0" tIns="0" rIns="0" bIns="0"/>
           <a:lstStyle/>
           <a:p>
-            <a:pPr marL="228600" indent="0">
-              <a:lnSpc>
-                <a:spcPct val="100000"/>
-              </a:lnSpc>
-              <a:buClrTx/>
-              <a:buSzTx/>
-              <a:buFontTx/>
-              <a:buNone/>
-              <a:defRPr sz="1200">
-                <a:solidFill>
-                  <a:srgbClr val="132E6C"/>
-                </a:solidFill>
-                <a:latin typeface="Libre Franklin"/>
-                <a:ea typeface="Libre Franklin"/>
-                <a:cs typeface="Libre Franklin"/>
-                <a:sym typeface="Libre Franklin"/>
-              </a:defRPr>
-            </a:pPr>
+            <a:pPr/>
           </a:p>
         </p:txBody>
       </p:sp>
@@ -3195,7 +3162,7 @@
         <p:spPr>
           <a:xfrm>
             <a:off x="6331653" y="2856052"/>
-            <a:ext cx="1507302" cy="1"/>
+            <a:ext cx="1507303" cy="2"/>
           </a:xfrm>
           <a:prstGeom prst="line">
             <a:avLst/>
@@ -3209,7 +3176,7 @@
           </a:ln>
         </p:spPr>
         <p:txBody>
-          <a:bodyPr lIns="0" tIns="0" rIns="0" bIns="0"/>
+          <a:bodyPr lIns="45718" tIns="45718" rIns="45718" bIns="45718"/>
           <a:lstStyle/>
           <a:p>
             <a:pPr/>
@@ -3226,8 +3193,8 @@
         </p:nvSpPr>
         <p:spPr>
           <a:xfrm>
-            <a:off x="4419600" y="4608064"/>
-            <a:ext cx="2133600" cy="318397"/>
+            <a:off x="6216389" y="4608065"/>
+            <a:ext cx="336812" cy="318395"/>
           </a:xfrm>
           <a:prstGeom prst="rect">
             <a:avLst/>
@@ -3287,7 +3254,7 @@
         <p:spPr>
           <a:xfrm>
             <a:off x="9605233" y="1373281"/>
-            <a:ext cx="228601" cy="1428751"/>
+            <a:ext cx="228602" cy="1428751"/>
           </a:xfrm>
           <a:prstGeom prst="rect">
             <a:avLst/>
@@ -3378,8 +3345,8 @@
         </p:nvSpPr>
         <p:spPr>
           <a:xfrm>
-            <a:off x="1041419" y="859630"/>
-            <a:ext cx="6858304" cy="3811192"/>
+            <a:off x="1041418" y="859629"/>
+            <a:ext cx="6858305" cy="3811194"/>
           </a:xfrm>
           <a:prstGeom prst="rect">
             <a:avLst/>
@@ -3388,7 +3355,7 @@
         <p:txBody>
           <a:bodyPr lIns="34275" tIns="34275" rIns="34275" bIns="34275"/>
           <a:lstStyle>
-            <a:lvl1pPr marL="228600" indent="0" algn="ctr">
+            <a:lvl1pPr marL="0" indent="228600" algn="ctr">
               <a:lnSpc>
                 <a:spcPct val="90000"/>
               </a:lnSpc>
@@ -3537,7 +3504,7 @@
         <p:spPr>
           <a:xfrm>
             <a:off x="6198244" y="4116751"/>
-            <a:ext cx="2048719" cy="718575"/>
+            <a:ext cx="2048720" cy="718576"/>
           </a:xfrm>
           <a:prstGeom prst="rect">
             <a:avLst/>
@@ -3547,24 +3514,7 @@
           <a:bodyPr lIns="0" tIns="0" rIns="0" bIns="0" anchor="ctr"/>
           <a:lstStyle/>
           <a:p>
-            <a:pPr marL="228600" indent="0">
-              <a:lnSpc>
-                <a:spcPct val="100000"/>
-              </a:lnSpc>
-              <a:buClrTx/>
-              <a:buSzTx/>
-              <a:buFontTx/>
-              <a:buNone/>
-              <a:defRPr sz="1200">
-                <a:solidFill>
-                  <a:srgbClr val="FFFFFF"/>
-                </a:solidFill>
-                <a:latin typeface="Libre Franklin"/>
-                <a:ea typeface="Libre Franklin"/>
-                <a:cs typeface="Libre Franklin"/>
-                <a:sym typeface="Libre Franklin"/>
-              </a:defRPr>
-            </a:pPr>
+            <a:pPr/>
           </a:p>
         </p:txBody>
       </p:sp>
@@ -3576,8 +3526,8 @@
         </p:nvSpPr>
         <p:spPr>
           <a:xfrm flipV="1">
-            <a:off x="6043253" y="4116750"/>
-            <a:ext cx="1" cy="1257016"/>
+            <a:off x="6043252" y="4116749"/>
+            <a:ext cx="2" cy="1257017"/>
           </a:xfrm>
           <a:prstGeom prst="line">
             <a:avLst/>
@@ -3591,7 +3541,7 @@
           </a:ln>
         </p:spPr>
         <p:txBody>
-          <a:bodyPr lIns="0" tIns="0" rIns="0" bIns="0"/>
+          <a:bodyPr lIns="45718" tIns="45718" rIns="45718" bIns="45718"/>
           <a:lstStyle/>
           <a:p>
             <a:pPr/>
@@ -3609,7 +3559,7 @@
         <p:spPr>
           <a:xfrm>
             <a:off x="2601409" y="4116751"/>
-            <a:ext cx="3264062" cy="718575"/>
+            <a:ext cx="3264063" cy="718576"/>
           </a:xfrm>
           <a:prstGeom prst="rect">
             <a:avLst/>
@@ -3619,24 +3569,7 @@
           <a:bodyPr lIns="0" tIns="0" rIns="0" bIns="0" anchor="ctr"/>
           <a:lstStyle/>
           <a:p>
-            <a:pPr marL="228600" indent="0" algn="r">
-              <a:lnSpc>
-                <a:spcPct val="100000"/>
-              </a:lnSpc>
-              <a:buClrTx/>
-              <a:buSzTx/>
-              <a:buFontTx/>
-              <a:buNone/>
-              <a:defRPr b="1" sz="2400">
-                <a:solidFill>
-                  <a:srgbClr val="FFFFFF"/>
-                </a:solidFill>
-                <a:latin typeface="Franklin Gothic"/>
-                <a:ea typeface="Franklin Gothic"/>
-                <a:cs typeface="Franklin Gothic"/>
-                <a:sym typeface="Franklin Gothic"/>
-              </a:defRPr>
-            </a:pPr>
+            <a:pPr/>
           </a:p>
         </p:txBody>
       </p:sp>
@@ -3650,8 +3583,8 @@
         </p:nvSpPr>
         <p:spPr>
           <a:xfrm>
-            <a:off x="4419600" y="4608064"/>
-            <a:ext cx="2133600" cy="318397"/>
+            <a:off x="6216389" y="4608065"/>
+            <a:ext cx="336812" cy="318395"/>
           </a:xfrm>
           <a:prstGeom prst="rect">
             <a:avLst/>
@@ -3702,8 +3635,8 @@
         </p:nvSpPr>
         <p:spPr>
           <a:xfrm>
-            <a:off x="311699" y="2150849"/>
-            <a:ext cx="8520602" cy="841801"/>
+            <a:off x="311698" y="2150848"/>
+            <a:ext cx="8520603" cy="841802"/>
           </a:xfrm>
           <a:prstGeom prst="rect">
             <a:avLst/>
@@ -3791,7 +3724,7 @@
         <p:spPr>
           <a:xfrm>
             <a:off x="9605233" y="1373281"/>
-            <a:ext cx="228601" cy="1428751"/>
+            <a:ext cx="228602" cy="1428751"/>
           </a:xfrm>
           <a:prstGeom prst="rect">
             <a:avLst/>
@@ -3838,8 +3771,8 @@
         </p:nvSpPr>
         <p:spPr>
           <a:xfrm>
-            <a:off x="-1" y="1104366"/>
-            <a:ext cx="3932501" cy="4039136"/>
+            <a:off x="-2" y="1104366"/>
+            <a:ext cx="3932503" cy="4039137"/>
           </a:xfrm>
           <a:prstGeom prst="rect">
             <a:avLst/>
@@ -3880,7 +3813,7 @@
         <p:spPr>
           <a:xfrm>
             <a:off x="4314464" y="1345556"/>
-            <a:ext cx="4535623" cy="1562583"/>
+            <a:ext cx="4535624" cy="1562584"/>
           </a:xfrm>
           <a:prstGeom prst="rect">
             <a:avLst/>
@@ -3889,7 +3822,7 @@
         <p:txBody>
           <a:bodyPr lIns="0" tIns="0" rIns="0" bIns="0" anchor="b"/>
           <a:lstStyle>
-            <a:lvl1pPr marL="228600" indent="0">
+            <a:lvl1pPr marL="0" indent="228600">
               <a:lnSpc>
                 <a:spcPct val="100000"/>
               </a:lnSpc>
@@ -3907,7 +3840,7 @@
                 <a:sym typeface="Franklin Gothic"/>
               </a:defRPr>
             </a:lvl1pPr>
-            <a:lvl2pPr marL="1389529" indent="-811679">
+            <a:lvl2pPr marL="1389529" indent="-811678">
               <a:lnSpc>
                 <a:spcPct val="100000"/>
               </a:lnSpc>
@@ -3925,7 +3858,7 @@
                 <a:sym typeface="Franklin Gothic"/>
               </a:defRPr>
             </a:lvl2pPr>
-            <a:lvl3pPr marL="1932940" indent="-885190">
+            <a:lvl3pPr marL="1932939" indent="-885189">
               <a:lnSpc>
                 <a:spcPct val="100000"/>
               </a:lnSpc>
@@ -3943,7 +3876,7 @@
                 <a:sym typeface="Franklin Gothic"/>
               </a:defRPr>
             </a:lvl3pPr>
-            <a:lvl4pPr marL="2441121" indent="-929821">
+            <a:lvl4pPr marL="2441120" indent="-929820">
               <a:lnSpc>
                 <a:spcPct val="100000"/>
               </a:lnSpc>
@@ -3961,7 +3894,7 @@
                 <a:sym typeface="Franklin Gothic"/>
               </a:defRPr>
             </a:lvl4pPr>
-            <a:lvl5pPr marL="2898321" indent="-929821">
+            <a:lvl5pPr marL="2898320" indent="-929820">
               <a:lnSpc>
                 <a:spcPct val="100000"/>
               </a:lnSpc>
@@ -4023,7 +3956,7 @@
         <p:spPr>
           <a:xfrm>
             <a:off x="314661" y="1251869"/>
-            <a:ext cx="3429001" cy="3429001"/>
+            <a:ext cx="3429002" cy="3429002"/>
           </a:xfrm>
           <a:prstGeom prst="rect">
             <a:avLst/>
@@ -4049,8 +3982,8 @@
         </p:nvSpPr>
         <p:spPr>
           <a:xfrm>
-            <a:off x="739587" y="429311"/>
-            <a:ext cx="6858001" cy="675056"/>
+            <a:off x="739586" y="429311"/>
+            <a:ext cx="6858002" cy="675056"/>
           </a:xfrm>
           <a:prstGeom prst="rect">
             <a:avLst/>
@@ -4129,8 +4062,8 @@
         </p:nvSpPr>
         <p:spPr>
           <a:xfrm>
-            <a:off x="3819645" y="2126846"/>
-            <a:ext cx="225709" cy="225707"/>
+            <a:off x="3819645" y="2126845"/>
+            <a:ext cx="225711" cy="225709"/>
           </a:xfrm>
           <a:prstGeom prst="ellipse">
             <a:avLst/>
@@ -4171,7 +4104,7 @@
         <p:spPr>
           <a:xfrm>
             <a:off x="4314464" y="2908138"/>
-            <a:ext cx="3550534" cy="3939303"/>
+            <a:ext cx="3550535" cy="3939303"/>
           </a:xfrm>
           <a:prstGeom prst="rect">
             <a:avLst/>
@@ -4181,24 +4114,7 @@
           <a:bodyPr lIns="0" tIns="0" rIns="0" bIns="0"/>
           <a:lstStyle/>
           <a:p>
-            <a:pPr marL="228600" indent="0">
-              <a:lnSpc>
-                <a:spcPct val="100000"/>
-              </a:lnSpc>
-              <a:buClrTx/>
-              <a:buSzTx/>
-              <a:buFontTx/>
-              <a:buNone/>
-              <a:defRPr sz="2100">
-                <a:solidFill>
-                  <a:srgbClr val="132E6C"/>
-                </a:solidFill>
-                <a:latin typeface="Libre Franklin"/>
-                <a:ea typeface="Libre Franklin"/>
-                <a:cs typeface="Libre Franklin"/>
-                <a:sym typeface="Libre Franklin"/>
-              </a:defRPr>
-            </a:pPr>
+            <a:pPr/>
           </a:p>
         </p:txBody>
       </p:sp>
@@ -4211,7 +4127,7 @@
         <p:spPr>
           <a:xfrm>
             <a:off x="4045351" y="2743200"/>
-            <a:ext cx="1484454" cy="0"/>
+            <a:ext cx="1484455" cy="0"/>
           </a:xfrm>
           <a:prstGeom prst="line">
             <a:avLst/>
@@ -4225,7 +4141,7 @@
           </a:ln>
         </p:spPr>
         <p:txBody>
-          <a:bodyPr lIns="0" tIns="0" rIns="0" bIns="0"/>
+          <a:bodyPr lIns="45718" tIns="45718" rIns="45718" bIns="45718"/>
           <a:lstStyle/>
           <a:p>
             <a:pPr/>
@@ -4242,8 +4158,8 @@
         </p:nvSpPr>
         <p:spPr>
           <a:xfrm>
-            <a:off x="4419600" y="4608064"/>
-            <a:ext cx="2133600" cy="318397"/>
+            <a:off x="6216389" y="4608065"/>
+            <a:ext cx="336812" cy="318395"/>
           </a:xfrm>
           <a:prstGeom prst="rect">
             <a:avLst/>
@@ -4303,7 +4219,7 @@
         <p:spPr>
           <a:xfrm>
             <a:off x="9605233" y="1373281"/>
-            <a:ext cx="228601" cy="1428751"/>
+            <a:ext cx="228602" cy="1428751"/>
           </a:xfrm>
           <a:prstGeom prst="rect">
             <a:avLst/>
@@ -4391,8 +4307,8 @@
         </p:nvSpPr>
         <p:spPr>
           <a:xfrm>
-            <a:off x="314661" y="3416268"/>
-            <a:ext cx="2379108" cy="881806"/>
+            <a:off x="314661" y="3416267"/>
+            <a:ext cx="2379109" cy="881807"/>
           </a:xfrm>
           <a:prstGeom prst="rect">
             <a:avLst/>
@@ -4401,7 +4317,7 @@
         <p:txBody>
           <a:bodyPr lIns="0" tIns="0" rIns="0" bIns="0" anchor="b"/>
           <a:lstStyle>
-            <a:lvl1pPr marL="228600" indent="0">
+            <a:lvl1pPr marL="0" indent="228600">
               <a:lnSpc>
                 <a:spcPct val="100000"/>
               </a:lnSpc>
@@ -4419,7 +4335,7 @@
                 <a:sym typeface="Franklin Gothic"/>
               </a:defRPr>
             </a:lvl1pPr>
-            <a:lvl2pPr marL="1112370" indent="-534520">
+            <a:lvl2pPr marL="1112369" indent="-534519">
               <a:lnSpc>
                 <a:spcPct val="100000"/>
               </a:lnSpc>
@@ -4437,7 +4353,7 @@
                 <a:sym typeface="Franklin Gothic"/>
               </a:defRPr>
             </a:lvl2pPr>
-            <a:lvl3pPr marL="1630679" indent="-582929">
+            <a:lvl3pPr marL="1630678" indent="-582928">
               <a:lnSpc>
                 <a:spcPct val="100000"/>
               </a:lnSpc>
@@ -4455,7 +4371,7 @@
                 <a:sym typeface="Franklin Gothic"/>
               </a:defRPr>
             </a:lvl3pPr>
-            <a:lvl4pPr marL="2123621" indent="-612321">
+            <a:lvl4pPr marL="2123620" indent="-612320">
               <a:lnSpc>
                 <a:spcPct val="100000"/>
               </a:lnSpc>
@@ -4473,7 +4389,7 @@
                 <a:sym typeface="Franklin Gothic"/>
               </a:defRPr>
             </a:lvl4pPr>
-            <a:lvl5pPr marL="2580821" indent="-612321">
+            <a:lvl5pPr marL="2580820" indent="-612320">
               <a:lnSpc>
                 <a:spcPct val="100000"/>
               </a:lnSpc>
@@ -4562,7 +4478,7 @@
         <p:spPr>
           <a:xfrm>
             <a:off x="314660" y="4360250"/>
-            <a:ext cx="2352495" cy="687145"/>
+            <a:ext cx="2352495" cy="687146"/>
           </a:xfrm>
           <a:prstGeom prst="rect">
             <a:avLst/>
@@ -4572,24 +4488,7 @@
           <a:bodyPr lIns="0" tIns="0" rIns="0" bIns="0"/>
           <a:lstStyle/>
           <a:p>
-            <a:pPr marL="228600" indent="0">
-              <a:lnSpc>
-                <a:spcPct val="100000"/>
-              </a:lnSpc>
-              <a:buClrTx/>
-              <a:buSzTx/>
-              <a:buFontTx/>
-              <a:buNone/>
-              <a:defRPr sz="1400">
-                <a:solidFill>
-                  <a:srgbClr val="132E6C"/>
-                </a:solidFill>
-                <a:latin typeface="Libre Franklin"/>
-                <a:ea typeface="Libre Franklin"/>
-                <a:cs typeface="Libre Franklin"/>
-                <a:sym typeface="Libre Franklin"/>
-              </a:defRPr>
-            </a:pPr>
+            <a:pPr/>
           </a:p>
         </p:txBody>
       </p:sp>
@@ -4602,7 +4501,7 @@
         <p:spPr>
           <a:xfrm flipH="1">
             <a:off x="3031819" y="1009167"/>
-            <a:ext cx="1" cy="4163520"/>
+            <a:ext cx="2" cy="4163521"/>
           </a:xfrm>
           <a:prstGeom prst="line">
             <a:avLst/>
@@ -4616,7 +4515,7 @@
           </a:ln>
         </p:spPr>
         <p:txBody>
-          <a:bodyPr lIns="0" tIns="0" rIns="0" bIns="0"/>
+          <a:bodyPr lIns="45718" tIns="45718" rIns="45718" bIns="45718"/>
           <a:lstStyle/>
           <a:p>
             <a:pPr/>
@@ -4671,7 +4570,7 @@
         <p:spPr>
           <a:xfrm>
             <a:off x="3322880" y="1009167"/>
-            <a:ext cx="2402945" cy="2407102"/>
+            <a:ext cx="2402946" cy="2407102"/>
           </a:xfrm>
           <a:prstGeom prst="rect">
             <a:avLst/>
@@ -4711,8 +4610,8 @@
         </p:nvSpPr>
         <p:spPr>
           <a:xfrm>
-            <a:off x="3322880" y="3416268"/>
-            <a:ext cx="2415352" cy="881806"/>
+            <a:off x="3322880" y="3416267"/>
+            <a:ext cx="2415353" cy="881806"/>
           </a:xfrm>
           <a:prstGeom prst="rect">
             <a:avLst/>
@@ -4722,24 +4621,7 @@
           <a:bodyPr lIns="0" tIns="0" rIns="0" bIns="0" anchor="b"/>
           <a:lstStyle/>
           <a:p>
-            <a:pPr marL="228600" indent="0">
-              <a:lnSpc>
-                <a:spcPct val="100000"/>
-              </a:lnSpc>
-              <a:buClrTx/>
-              <a:buSzTx/>
-              <a:buFontTx/>
-              <a:buNone/>
-              <a:defRPr b="1" sz="2700">
-                <a:solidFill>
-                  <a:srgbClr val="132E6C"/>
-                </a:solidFill>
-                <a:latin typeface="Franklin Gothic"/>
-                <a:ea typeface="Franklin Gothic"/>
-                <a:cs typeface="Franklin Gothic"/>
-                <a:sym typeface="Franklin Gothic"/>
-              </a:defRPr>
-            </a:pPr>
+            <a:pPr/>
           </a:p>
         </p:txBody>
       </p:sp>
@@ -4753,8 +4635,8 @@
         </p:nvSpPr>
         <p:spPr>
           <a:xfrm>
-            <a:off x="3471965" y="1275673"/>
-            <a:ext cx="2057401" cy="2057401"/>
+            <a:off x="3471964" y="1275673"/>
+            <a:ext cx="2057402" cy="2057401"/>
           </a:xfrm>
           <a:prstGeom prst="rect">
             <a:avLst/>
@@ -4781,7 +4663,7 @@
         <p:spPr>
           <a:xfrm>
             <a:off x="3322880" y="4360250"/>
-            <a:ext cx="2229980" cy="812437"/>
+            <a:ext cx="2229981" cy="812438"/>
           </a:xfrm>
           <a:prstGeom prst="rect">
             <a:avLst/>
@@ -4791,24 +4673,7 @@
           <a:bodyPr lIns="0" tIns="0" rIns="0" bIns="0"/>
           <a:lstStyle/>
           <a:p>
-            <a:pPr marL="228600" indent="0">
-              <a:lnSpc>
-                <a:spcPct val="100000"/>
-              </a:lnSpc>
-              <a:buClrTx/>
-              <a:buSzTx/>
-              <a:buFontTx/>
-              <a:buNone/>
-              <a:defRPr sz="1400">
-                <a:solidFill>
-                  <a:srgbClr val="132E6C"/>
-                </a:solidFill>
-                <a:latin typeface="Libre Franklin"/>
-                <a:ea typeface="Libre Franklin"/>
-                <a:cs typeface="Libre Franklin"/>
-                <a:sym typeface="Libre Franklin"/>
-              </a:defRPr>
-            </a:pPr>
+            <a:pPr/>
           </a:p>
         </p:txBody>
       </p:sp>
@@ -4821,7 +4686,7 @@
         <p:spPr>
           <a:xfrm flipH="1">
             <a:off x="6096691" y="1009167"/>
-            <a:ext cx="1" cy="4163520"/>
+            <a:ext cx="2" cy="4163521"/>
           </a:xfrm>
           <a:prstGeom prst="line">
             <a:avLst/>
@@ -4835,7 +4700,7 @@
           </a:ln>
         </p:spPr>
         <p:txBody>
-          <a:bodyPr lIns="0" tIns="0" rIns="0" bIns="0"/>
+          <a:bodyPr lIns="45718" tIns="45718" rIns="45718" bIns="45718"/>
           <a:lstStyle/>
           <a:p>
             <a:pPr/>
@@ -4851,7 +4716,7 @@
         <p:spPr>
           <a:xfrm>
             <a:off x="6461354" y="1009167"/>
-            <a:ext cx="2402945" cy="2407102"/>
+            <a:ext cx="2402946" cy="2407102"/>
           </a:xfrm>
           <a:prstGeom prst="rect">
             <a:avLst/>
@@ -4891,8 +4756,8 @@
         </p:nvSpPr>
         <p:spPr>
           <a:xfrm>
-            <a:off x="6604235" y="1275673"/>
-            <a:ext cx="2057401" cy="2057401"/>
+            <a:off x="6604234" y="1275673"/>
+            <a:ext cx="2057402" cy="2057401"/>
           </a:xfrm>
           <a:prstGeom prst="rect">
             <a:avLst/>
@@ -4919,7 +4784,7 @@
         <p:spPr>
           <a:xfrm>
             <a:off x="6461354" y="4360250"/>
-            <a:ext cx="2260053" cy="783251"/>
+            <a:ext cx="2260054" cy="783252"/>
           </a:xfrm>
           <a:prstGeom prst="rect">
             <a:avLst/>
@@ -4929,24 +4794,7 @@
           <a:bodyPr lIns="0" tIns="0" rIns="0" bIns="0"/>
           <a:lstStyle/>
           <a:p>
-            <a:pPr marL="228600" indent="0">
-              <a:lnSpc>
-                <a:spcPct val="100000"/>
-              </a:lnSpc>
-              <a:buClrTx/>
-              <a:buSzTx/>
-              <a:buFontTx/>
-              <a:buNone/>
-              <a:defRPr sz="1400">
-                <a:solidFill>
-                  <a:srgbClr val="132E6C"/>
-                </a:solidFill>
-                <a:latin typeface="Libre Franklin"/>
-                <a:ea typeface="Libre Franklin"/>
-                <a:cs typeface="Libre Franklin"/>
-                <a:sym typeface="Libre Franklin"/>
-              </a:defRPr>
-            </a:pPr>
+            <a:pPr/>
           </a:p>
         </p:txBody>
       </p:sp>
@@ -4961,7 +4809,7 @@
         <p:spPr>
           <a:xfrm>
             <a:off x="6461354" y="3426924"/>
-            <a:ext cx="2415352" cy="881806"/>
+            <a:ext cx="2415353" cy="881806"/>
           </a:xfrm>
           <a:prstGeom prst="rect">
             <a:avLst/>
@@ -4971,24 +4819,7 @@
           <a:bodyPr lIns="0" tIns="0" rIns="0" bIns="0" anchor="b"/>
           <a:lstStyle/>
           <a:p>
-            <a:pPr marL="228600" indent="0">
-              <a:lnSpc>
-                <a:spcPct val="100000"/>
-              </a:lnSpc>
-              <a:buClrTx/>
-              <a:buSzTx/>
-              <a:buFontTx/>
-              <a:buNone/>
-              <a:defRPr b="1" sz="2700">
-                <a:solidFill>
-                  <a:srgbClr val="132E6C"/>
-                </a:solidFill>
-                <a:latin typeface="Franklin Gothic"/>
-                <a:ea typeface="Franklin Gothic"/>
-                <a:cs typeface="Franklin Gothic"/>
-                <a:sym typeface="Franklin Gothic"/>
-              </a:defRPr>
-            </a:pPr>
+            <a:pPr/>
           </a:p>
         </p:txBody>
       </p:sp>
@@ -5002,8 +4833,8 @@
         </p:nvSpPr>
         <p:spPr>
           <a:xfrm>
-            <a:off x="739587" y="429311"/>
-            <a:ext cx="6858001" cy="675056"/>
+            <a:off x="739586" y="429311"/>
+            <a:ext cx="6858002" cy="675056"/>
           </a:xfrm>
           <a:prstGeom prst="rect">
             <a:avLst/>
@@ -5045,8 +4876,8 @@
         </p:nvSpPr>
         <p:spPr>
           <a:xfrm>
-            <a:off x="4419600" y="4608064"/>
-            <a:ext cx="2133600" cy="318397"/>
+            <a:off x="6216389" y="4608065"/>
+            <a:ext cx="336812" cy="318395"/>
           </a:xfrm>
           <a:prstGeom prst="rect">
             <a:avLst/>
@@ -5106,7 +4937,7 @@
         <p:spPr>
           <a:xfrm>
             <a:off x="9605233" y="1373281"/>
-            <a:ext cx="228601" cy="1428751"/>
+            <a:ext cx="228602" cy="1428751"/>
           </a:xfrm>
           <a:prstGeom prst="rect">
             <a:avLst/>
@@ -5155,8 +4986,8 @@
         </p:nvSpPr>
         <p:spPr>
           <a:xfrm>
-            <a:off x="6944810" y="1077685"/>
-            <a:ext cx="1905276" cy="3592700"/>
+            <a:off x="6944810" y="1077684"/>
+            <a:ext cx="1905277" cy="3592702"/>
           </a:xfrm>
           <a:prstGeom prst="rect">
             <a:avLst/>
@@ -5225,7 +5056,7 @@
                 <a:sym typeface="Libre Franklin"/>
               </a:defRPr>
             </a:lvl3pPr>
-            <a:lvl4pPr marL="1896835" indent="-385535">
+            <a:lvl4pPr marL="1896834" indent="-385534">
               <a:lnSpc>
                 <a:spcPct val="100000"/>
               </a:lnSpc>
@@ -5245,7 +5076,7 @@
                 <a:sym typeface="Libre Franklin"/>
               </a:defRPr>
             </a:lvl4pPr>
-            <a:lvl5pPr marL="2354035" indent="-385535">
+            <a:lvl5pPr marL="2354034" indent="-385534">
               <a:lnSpc>
                 <a:spcPct val="100000"/>
               </a:lnSpc>
@@ -5335,8 +5166,8 @@
         </p:nvSpPr>
         <p:spPr>
           <a:xfrm>
-            <a:off x="4419600" y="4608064"/>
-            <a:ext cx="2133600" cy="318397"/>
+            <a:off x="6216389" y="4608065"/>
+            <a:ext cx="336812" cy="318395"/>
           </a:xfrm>
           <a:prstGeom prst="rect">
             <a:avLst/>
@@ -5417,7 +5248,7 @@
         <p:spPr>
           <a:xfrm>
             <a:off x="4279493" y="865960"/>
-            <a:ext cx="4275422" cy="1576114"/>
+            <a:ext cx="4275423" cy="1576115"/>
           </a:xfrm>
           <a:prstGeom prst="rect">
             <a:avLst/>
@@ -5459,8 +5290,8 @@
         </p:nvSpPr>
         <p:spPr>
           <a:xfrm>
-            <a:off x="-1" y="1229329"/>
-            <a:ext cx="4448278" cy="4450502"/>
+            <a:off x="-2" y="1229329"/>
+            <a:ext cx="4448280" cy="4450503"/>
           </a:xfrm>
           <a:prstGeom prst="rect">
             <a:avLst/>
@@ -5484,8 +5315,8 @@
         </p:nvSpPr>
         <p:spPr>
           <a:xfrm>
-            <a:off x="3879358" y="972009"/>
-            <a:ext cx="257323" cy="257323"/>
+            <a:off x="3879358" y="972008"/>
+            <a:ext cx="257325" cy="257325"/>
           </a:xfrm>
           <a:prstGeom prst="ellipse">
             <a:avLst/>
@@ -5523,8 +5354,8 @@
         </p:nvSpPr>
         <p:spPr>
           <a:xfrm flipH="1" flipV="1">
-            <a:off x="4210884" y="2690754"/>
-            <a:ext cx="1970109" cy="1"/>
+            <a:off x="4210884" y="2690753"/>
+            <a:ext cx="1970110" cy="2"/>
           </a:xfrm>
           <a:prstGeom prst="line">
             <a:avLst/>
@@ -5538,7 +5369,7 @@
           </a:ln>
         </p:spPr>
         <p:txBody>
-          <a:bodyPr lIns="0" tIns="0" rIns="0" bIns="0"/>
+          <a:bodyPr lIns="45718" tIns="45718" rIns="45718" bIns="45718"/>
           <a:lstStyle/>
           <a:p>
             <a:pPr/>
@@ -5556,7 +5387,7 @@
         <p:spPr>
           <a:xfrm>
             <a:off x="5129486" y="2760782"/>
-            <a:ext cx="2831034" cy="2073111"/>
+            <a:ext cx="2831035" cy="2073112"/>
           </a:xfrm>
           <a:prstGeom prst="rect">
             <a:avLst/>
@@ -5565,7 +5396,7 @@
         <p:txBody>
           <a:bodyPr lIns="0" tIns="0" rIns="0" bIns="0"/>
           <a:lstStyle>
-            <a:lvl1pPr marL="228600" indent="0">
+            <a:lvl1pPr marL="0" indent="228600">
               <a:lnSpc>
                 <a:spcPct val="100000"/>
               </a:lnSpc>
@@ -5583,7 +5414,7 @@
                 <a:sym typeface="Libre Franklin"/>
               </a:defRPr>
             </a:lvl1pPr>
-            <a:lvl2pPr marL="228600" indent="457200">
+            <a:lvl2pPr marL="0" indent="228600">
               <a:lnSpc>
                 <a:spcPct val="100000"/>
               </a:lnSpc>
@@ -5601,7 +5432,7 @@
                 <a:sym typeface="Libre Franklin"/>
               </a:defRPr>
             </a:lvl2pPr>
-            <a:lvl3pPr marL="1501139" indent="-453389">
+            <a:lvl3pPr marL="1501138" indent="-453388">
               <a:lnSpc>
                 <a:spcPct val="100000"/>
               </a:lnSpc>
@@ -5696,8 +5527,8 @@
         </p:nvSpPr>
         <p:spPr>
           <a:xfrm>
-            <a:off x="8941552" y="650631"/>
-            <a:ext cx="202448" cy="4246679"/>
+            <a:off x="8941551" y="650630"/>
+            <a:ext cx="202449" cy="4246681"/>
           </a:xfrm>
           <a:prstGeom prst="rect">
             <a:avLst/>
@@ -5737,8 +5568,8 @@
         </p:nvSpPr>
         <p:spPr>
           <a:xfrm>
-            <a:off x="4419600" y="4608064"/>
-            <a:ext cx="2133600" cy="318397"/>
+            <a:off x="6216389" y="4608065"/>
+            <a:ext cx="336812" cy="318395"/>
           </a:xfrm>
           <a:prstGeom prst="rect">
             <a:avLst/>
@@ -5933,8 +5764,8 @@
         </p:nvSpPr>
         <p:spPr>
           <a:xfrm>
-            <a:off x="311699" y="1152475"/>
-            <a:ext cx="3999902" cy="3416400"/>
+            <a:off x="311698" y="1152475"/>
+            <a:ext cx="3999903" cy="3416400"/>
           </a:xfrm>
           <a:prstGeom prst="rect">
             <a:avLst/>
@@ -6006,8 +5837,8 @@
         </p:nvSpPr>
         <p:spPr>
           <a:xfrm>
-            <a:off x="4832399" y="1152475"/>
-            <a:ext cx="3999902" cy="3416400"/>
+            <a:off x="4832398" y="1152475"/>
+            <a:ext cx="3999903" cy="3416400"/>
           </a:xfrm>
           <a:prstGeom prst="rect">
             <a:avLst/>
@@ -6017,10 +5848,7 @@
           <a:bodyPr/>
           <a:lstStyle/>
           <a:p>
-            <a:pPr indent="-317500">
-              <a:buSzPts val="1400"/>
-              <a:defRPr sz="1400"/>
-            </a:pPr>
+            <a:pPr/>
           </a:p>
         </p:txBody>
       </p:sp>
@@ -6154,8 +5982,8 @@
         </p:nvSpPr>
         <p:spPr>
           <a:xfrm>
-            <a:off x="311699" y="555600"/>
-            <a:ext cx="2808001" cy="755700"/>
+            <a:off x="311698" y="555600"/>
+            <a:ext cx="2808003" cy="755700"/>
           </a:xfrm>
           <a:prstGeom prst="rect">
             <a:avLst/>
@@ -6186,8 +6014,8 @@
         </p:nvSpPr>
         <p:spPr>
           <a:xfrm>
-            <a:off x="311699" y="1389599"/>
-            <a:ext cx="2808001" cy="3179401"/>
+            <a:off x="311698" y="1389598"/>
+            <a:ext cx="2808003" cy="3179403"/>
           </a:xfrm>
           <a:prstGeom prst="rect">
             <a:avLst/>
@@ -6307,8 +6135,8 @@
         </p:nvSpPr>
         <p:spPr>
           <a:xfrm>
-            <a:off x="490250" y="450149"/>
-            <a:ext cx="6367801" cy="4090801"/>
+            <a:off x="490250" y="450148"/>
+            <a:ext cx="6367801" cy="4090803"/>
           </a:xfrm>
           <a:prstGeom prst="rect">
             <a:avLst/>
@@ -6385,8 +6213,8 @@
         </p:nvSpPr>
         <p:spPr>
           <a:xfrm>
-            <a:off x="4572000" y="-125"/>
-            <a:ext cx="4572000" cy="5143501"/>
+            <a:off x="4572000" y="-126"/>
+            <a:ext cx="4572000" cy="5143503"/>
           </a:xfrm>
           <a:prstGeom prst="rect">
             <a:avLst/>
@@ -6402,7 +6230,14 @@
           <a:bodyPr lIns="0" tIns="0" rIns="0" bIns="0" anchor="ctr"/>
           <a:lstStyle/>
           <a:p>
-            <a:pPr/>
+            <a:pPr>
+              <a:defRPr>
+                <a:latin typeface="+mj-lt"/>
+                <a:ea typeface="+mj-ea"/>
+                <a:cs typeface="+mj-cs"/>
+                <a:sym typeface="Arial"/>
+              </a:defRPr>
+            </a:pPr>
           </a:p>
         </p:txBody>
       </p:sp>
@@ -6417,7 +6252,7 @@
         <p:spPr>
           <a:xfrm>
             <a:off x="265500" y="1233175"/>
-            <a:ext cx="4045200" cy="1482301"/>
+            <a:ext cx="4045200" cy="1482302"/>
           </a:xfrm>
           <a:prstGeom prst="rect">
             <a:avLst/>
@@ -6458,7 +6293,7 @@
         <p:txBody>
           <a:bodyPr/>
           <a:lstStyle>
-            <a:lvl1pPr marL="342900" indent="-228600" algn="ctr">
+            <a:lvl1pPr marL="228600" indent="-114300" algn="ctr">
               <a:lnSpc>
                 <a:spcPct val="100000"/>
               </a:lnSpc>
@@ -6468,7 +6303,7 @@
               <a:buNone/>
               <a:defRPr sz="2100"/>
             </a:lvl1pPr>
-            <a:lvl2pPr marL="342900" indent="254000" algn="ctr">
+            <a:lvl2pPr marL="228600" indent="114300" algn="ctr">
               <a:lnSpc>
                 <a:spcPct val="100000"/>
               </a:lnSpc>
@@ -6478,7 +6313,7 @@
               <a:buNone/>
               <a:defRPr sz="2100"/>
             </a:lvl2pPr>
-            <a:lvl3pPr marL="342900" indent="711200" algn="ctr">
+            <a:lvl3pPr marL="228600" indent="114300" algn="ctr">
               <a:lnSpc>
                 <a:spcPct val="100000"/>
               </a:lnSpc>
@@ -6488,7 +6323,7 @@
               <a:buNone/>
               <a:defRPr sz="2100"/>
             </a:lvl3pPr>
-            <a:lvl4pPr marL="342900" indent="1168400" algn="ctr">
+            <a:lvl4pPr marL="228600" indent="114300" algn="ctr">
               <a:lnSpc>
                 <a:spcPct val="100000"/>
               </a:lnSpc>
@@ -6498,7 +6333,7 @@
               <a:buNone/>
               <a:defRPr sz="2100"/>
             </a:lvl4pPr>
-            <a:lvl5pPr marL="342900" indent="1625600" algn="ctr">
+            <a:lvl5pPr marL="228600" indent="114300" algn="ctr">
               <a:lnSpc>
                 <a:spcPct val="100000"/>
               </a:lnSpc>
@@ -6552,7 +6387,7 @@
         <p:spPr>
           <a:xfrm>
             <a:off x="4939500" y="724074"/>
-            <a:ext cx="3837000" cy="3695102"/>
+            <a:ext cx="3837000" cy="3695103"/>
           </a:xfrm>
           <a:prstGeom prst="rect">
             <a:avLst/>
@@ -6624,8 +6459,8 @@
         </p:nvSpPr>
         <p:spPr>
           <a:xfrm>
-            <a:off x="311699" y="4230575"/>
-            <a:ext cx="5998802" cy="605101"/>
+            <a:off x="311698" y="4230575"/>
+            <a:ext cx="5998804" cy="605102"/>
           </a:xfrm>
           <a:prstGeom prst="rect">
             <a:avLst/>
@@ -6634,7 +6469,7 @@
         <p:txBody>
           <a:bodyPr anchor="ctr"/>
           <a:lstStyle>
-            <a:lvl1pPr marL="228600" indent="0">
+            <a:lvl1pPr marL="0" indent="228600">
               <a:lnSpc>
                 <a:spcPct val="100000"/>
               </a:lnSpc>
@@ -6769,8 +6604,8 @@
         </p:nvSpPr>
         <p:spPr>
           <a:xfrm>
-            <a:off x="311699" y="445025"/>
-            <a:ext cx="8520602" cy="572701"/>
+            <a:off x="311698" y="445025"/>
+            <a:ext cx="8520603" cy="572702"/>
           </a:xfrm>
           <a:prstGeom prst="rect">
             <a:avLst/>
@@ -6785,7 +6620,7 @@
           </a:extLst>
         </p:spPr>
         <p:txBody>
-          <a:bodyPr lIns="91424" tIns="91424" rIns="91424" bIns="91424">
+          <a:bodyPr lIns="91423" tIns="91423" rIns="91423" bIns="91423">
             <a:normAutofit fontScale="100000" lnSpcReduction="0"/>
           </a:bodyPr>
           <a:lstStyle/>
@@ -6807,8 +6642,8 @@
         </p:nvSpPr>
         <p:spPr>
           <a:xfrm>
-            <a:off x="311699" y="1152475"/>
-            <a:ext cx="8520602" cy="3416400"/>
+            <a:off x="311698" y="1152475"/>
+            <a:ext cx="8520603" cy="3416400"/>
           </a:xfrm>
           <a:prstGeom prst="rect">
             <a:avLst/>
@@ -6823,7 +6658,7 @@
           </a:extLst>
         </p:spPr>
         <p:txBody>
-          <a:bodyPr lIns="91424" tIns="91424" rIns="91424" bIns="91424">
+          <a:bodyPr lIns="91423" tIns="91423" rIns="91423" bIns="91423">
             <a:normAutofit fontScale="100000" lnSpcReduction="0"/>
           </a:bodyPr>
           <a:lstStyle/>
@@ -6869,8 +6704,8 @@
         </p:nvSpPr>
         <p:spPr>
           <a:xfrm>
-            <a:off x="8684345" y="4700819"/>
-            <a:ext cx="336814" cy="318396"/>
+            <a:off x="8684348" y="4700820"/>
+            <a:ext cx="336812" cy="318394"/>
           </a:xfrm>
           <a:prstGeom prst="rect">
             <a:avLst/>
@@ -6880,17 +6715,19 @@
           </a:ln>
         </p:spPr>
         <p:txBody>
-          <a:bodyPr wrap="none" lIns="91424" tIns="91424" rIns="91424" bIns="91424" anchor="ctr">
+          <a:bodyPr wrap="none" lIns="91423" tIns="91423" rIns="91423" bIns="91423" anchor="ctr">
             <a:normAutofit fontScale="100000" lnSpcReduction="0"/>
           </a:bodyPr>
           <a:lstStyle>
             <a:lvl1pPr algn="r">
               <a:defRPr sz="1000">
                 <a:solidFill>
-                  <a:schemeClr val="accent2">
-                    <a:lumOff val="21764"/>
-                  </a:schemeClr>
+                  <a:srgbClr val="585858"/>
                 </a:solidFill>
+                <a:latin typeface="+mj-lt"/>
+                <a:ea typeface="+mj-ea"/>
+                <a:cs typeface="+mj-cs"/>
+                <a:sym typeface="Arial"/>
               </a:defRPr>
             </a:lvl1pPr>
           </a:lstStyle>
@@ -7178,9 +7015,7 @@
           <a:spcPts val="0"/>
         </a:spcAft>
         <a:buClr>
-          <a:schemeClr val="accent2">
-            <a:lumOff val="21764"/>
-          </a:schemeClr>
+          <a:srgbClr val="585858"/>
         </a:buClr>
         <a:buSzPts val="1800"/>
         <a:buFont typeface="Arial"/>
@@ -7188,9 +7023,7 @@
         <a:tabLst/>
         <a:defRPr b="0" baseline="0" cap="none" i="0" spc="0" strike="noStrike" sz="1800" u="none">
           <a:solidFill>
-            <a:schemeClr val="accent2">
-              <a:lumOff val="21764"/>
-            </a:schemeClr>
+            <a:srgbClr val="585858"/>
           </a:solidFill>
           <a:uFillTx/>
           <a:latin typeface="+mj-lt"/>
@@ -7199,7 +7032,7 @@
           <a:sym typeface="Arial"/>
         </a:defRPr>
       </a:lvl1pPr>
-      <a:lvl2pPr marL="1005114" marR="0" indent="-408214" algn="l" defTabSz="914400" rtl="0" latinLnBrk="0">
+      <a:lvl2pPr marL="1005114" marR="0" indent="-408213" algn="l" defTabSz="914400" rtl="0" latinLnBrk="0">
         <a:lnSpc>
           <a:spcPct val="115000"/>
         </a:lnSpc>
@@ -7210,9 +7043,7 @@
           <a:spcPts val="0"/>
         </a:spcAft>
         <a:buClr>
-          <a:schemeClr val="accent2">
-            <a:lumOff val="21764"/>
-          </a:schemeClr>
+          <a:srgbClr val="585858"/>
         </a:buClr>
         <a:buSzPts val="1800"/>
         <a:buFont typeface="Arial"/>
@@ -7220,9 +7051,7 @@
         <a:tabLst/>
         <a:defRPr b="0" baseline="0" cap="none" i="0" spc="0" strike="noStrike" sz="1800" u="none">
           <a:solidFill>
-            <a:schemeClr val="accent2">
-              <a:lumOff val="21764"/>
-            </a:schemeClr>
+            <a:srgbClr val="585858"/>
           </a:solidFill>
           <a:uFillTx/>
           <a:latin typeface="+mj-lt"/>
@@ -7242,9 +7071,7 @@
           <a:spcPts val="0"/>
         </a:spcAft>
         <a:buClr>
-          <a:schemeClr val="accent2">
-            <a:lumOff val="21764"/>
-          </a:schemeClr>
+          <a:srgbClr val="585858"/>
         </a:buClr>
         <a:buSzPts val="1800"/>
         <a:buFont typeface="Arial"/>
@@ -7252,9 +7079,7 @@
         <a:tabLst/>
         <a:defRPr b="0" baseline="0" cap="none" i="0" spc="0" strike="noStrike" sz="1800" u="none">
           <a:solidFill>
-            <a:schemeClr val="accent2">
-              <a:lumOff val="21764"/>
-            </a:schemeClr>
+            <a:srgbClr val="585858"/>
           </a:solidFill>
           <a:uFillTx/>
           <a:latin typeface="+mj-lt"/>
@@ -7274,9 +7099,7 @@
           <a:spcPts val="0"/>
         </a:spcAft>
         <a:buClr>
-          <a:schemeClr val="accent2">
-            <a:lumOff val="21764"/>
-          </a:schemeClr>
+          <a:srgbClr val="585858"/>
         </a:buClr>
         <a:buSzPts val="1800"/>
         <a:buFont typeface="Arial"/>
@@ -7284,9 +7107,7 @@
         <a:tabLst/>
         <a:defRPr b="0" baseline="0" cap="none" i="0" spc="0" strike="noStrike" sz="1800" u="none">
           <a:solidFill>
-            <a:schemeClr val="accent2">
-              <a:lumOff val="21764"/>
-            </a:schemeClr>
+            <a:srgbClr val="585858"/>
           </a:solidFill>
           <a:uFillTx/>
           <a:latin typeface="+mj-lt"/>
@@ -7306,9 +7127,7 @@
           <a:spcPts val="0"/>
         </a:spcAft>
         <a:buClr>
-          <a:schemeClr val="accent2">
-            <a:lumOff val="21764"/>
-          </a:schemeClr>
+          <a:srgbClr val="585858"/>
         </a:buClr>
         <a:buSzPts val="1800"/>
         <a:buFont typeface="Arial"/>
@@ -7316,9 +7135,7 @@
         <a:tabLst/>
         <a:defRPr b="0" baseline="0" cap="none" i="0" spc="0" strike="noStrike" sz="1800" u="none">
           <a:solidFill>
-            <a:schemeClr val="accent2">
-              <a:lumOff val="21764"/>
-            </a:schemeClr>
+            <a:srgbClr val="585858"/>
           </a:solidFill>
           <a:uFillTx/>
           <a:latin typeface="+mj-lt"/>
@@ -7338,9 +7155,7 @@
           <a:spcPts val="0"/>
         </a:spcAft>
         <a:buClr>
-          <a:schemeClr val="accent2">
-            <a:lumOff val="21764"/>
-          </a:schemeClr>
+          <a:srgbClr val="585858"/>
         </a:buClr>
         <a:buSzPts val="1800"/>
         <a:buFont typeface="Arial"/>
@@ -7348,9 +7163,7 @@
         <a:tabLst/>
         <a:defRPr b="0" baseline="0" cap="none" i="0" spc="0" strike="noStrike" sz="1800" u="none">
           <a:solidFill>
-            <a:schemeClr val="accent2">
-              <a:lumOff val="21764"/>
-            </a:schemeClr>
+            <a:srgbClr val="585858"/>
           </a:solidFill>
           <a:uFillTx/>
           <a:latin typeface="+mj-lt"/>
@@ -7359,7 +7172,7 @@
           <a:sym typeface="Arial"/>
         </a:defRPr>
       </a:lvl6pPr>
-      <a:lvl7pPr marL="3291114" marR="0" indent="-408214" algn="l" defTabSz="914400" rtl="0" latinLnBrk="0">
+      <a:lvl7pPr marL="3291113" marR="0" indent="-408214" algn="l" defTabSz="914400" rtl="0" latinLnBrk="0">
         <a:lnSpc>
           <a:spcPct val="115000"/>
         </a:lnSpc>
@@ -7370,9 +7183,7 @@
           <a:spcPts val="0"/>
         </a:spcAft>
         <a:buClr>
-          <a:schemeClr val="accent2">
-            <a:lumOff val="21764"/>
-          </a:schemeClr>
+          <a:srgbClr val="585858"/>
         </a:buClr>
         <a:buSzPts val="1800"/>
         <a:buFont typeface="Arial"/>
@@ -7380,9 +7191,7 @@
         <a:tabLst/>
         <a:defRPr b="0" baseline="0" cap="none" i="0" spc="0" strike="noStrike" sz="1800" u="none">
           <a:solidFill>
-            <a:schemeClr val="accent2">
-              <a:lumOff val="21764"/>
-            </a:schemeClr>
+            <a:srgbClr val="585858"/>
           </a:solidFill>
           <a:uFillTx/>
           <a:latin typeface="+mj-lt"/>
@@ -7391,7 +7200,7 @@
           <a:sym typeface="Arial"/>
         </a:defRPr>
       </a:lvl7pPr>
-      <a:lvl8pPr marL="3748314" marR="0" indent="-408214" algn="l" defTabSz="914400" rtl="0" latinLnBrk="0">
+      <a:lvl8pPr marL="3748313" marR="0" indent="-408213" algn="l" defTabSz="914400" rtl="0" latinLnBrk="0">
         <a:lnSpc>
           <a:spcPct val="115000"/>
         </a:lnSpc>
@@ -7402,9 +7211,7 @@
           <a:spcPts val="0"/>
         </a:spcAft>
         <a:buClr>
-          <a:schemeClr val="accent2">
-            <a:lumOff val="21764"/>
-          </a:schemeClr>
+          <a:srgbClr val="585858"/>
         </a:buClr>
         <a:buSzPts val="1800"/>
         <a:buFont typeface="Arial"/>
@@ -7412,9 +7219,7 @@
         <a:tabLst/>
         <a:defRPr b="0" baseline="0" cap="none" i="0" spc="0" strike="noStrike" sz="1800" u="none">
           <a:solidFill>
-            <a:schemeClr val="accent2">
-              <a:lumOff val="21764"/>
-            </a:schemeClr>
+            <a:srgbClr val="585858"/>
           </a:solidFill>
           <a:uFillTx/>
           <a:latin typeface="+mj-lt"/>
@@ -7423,7 +7228,7 @@
           <a:sym typeface="Arial"/>
         </a:defRPr>
       </a:lvl8pPr>
-      <a:lvl9pPr marL="4205514" marR="0" indent="-408214" algn="l" defTabSz="914400" rtl="0" latinLnBrk="0">
+      <a:lvl9pPr marL="4205513" marR="0" indent="-408213" algn="l" defTabSz="914400" rtl="0" latinLnBrk="0">
         <a:lnSpc>
           <a:spcPct val="115000"/>
         </a:lnSpc>
@@ -7434,9 +7239,7 @@
           <a:spcPts val="0"/>
         </a:spcAft>
         <a:buClr>
-          <a:schemeClr val="accent2">
-            <a:lumOff val="21764"/>
-          </a:schemeClr>
+          <a:srgbClr val="585858"/>
         </a:buClr>
         <a:buSzPts val="1800"/>
         <a:buFont typeface="Arial"/>
@@ -7444,9 +7247,7 @@
         <a:tabLst/>
         <a:defRPr b="0" baseline="0" cap="none" i="0" spc="0" strike="noStrike" sz="1800" u="none">
           <a:solidFill>
-            <a:schemeClr val="accent2">
-              <a:lumOff val="21764"/>
-            </a:schemeClr>
+            <a:srgbClr val="585858"/>
           </a:solidFill>
           <a:uFillTx/>
           <a:latin typeface="+mj-lt"/>
@@ -7723,8 +7524,8 @@
         </p:nvSpPr>
         <p:spPr>
           <a:xfrm>
-            <a:off x="918589" y="1805091"/>
-            <a:ext cx="7299608" cy="647426"/>
+            <a:off x="918589" y="1805090"/>
+            <a:ext cx="7299608" cy="647427"/>
           </a:xfrm>
           <a:prstGeom prst="rect">
             <a:avLst/>
@@ -7734,8 +7535,8 @@
           <a:bodyPr/>
           <a:lstStyle/>
           <a:p>
-            <a:pPr algn="ctr" defTabSz="502920">
-              <a:defRPr b="0" sz="1650">
+            <a:pPr algn="ctr" defTabSz="502919">
+              <a:defRPr b="0" sz="1600">
                 <a:solidFill>
                   <a:srgbClr val="000000"/>
                 </a:solidFill>
@@ -7746,10 +7547,9 @@
             </a:r>
             <a:br/>
             <a:r>
-              <a:rPr sz="1485"/>
+              <a:rPr sz="1400"/>
               <a:t>Working efficiently with software</a:t>
             </a:r>
-            <a:endParaRPr sz="1485"/>
           </a:p>
         </p:txBody>
       </p:sp>
@@ -7764,7 +7564,7 @@
         <p:spPr>
           <a:xfrm>
             <a:off x="2041799" y="2871907"/>
-            <a:ext cx="4934471" cy="2073111"/>
+            <a:ext cx="4934471" cy="2073112"/>
           </a:xfrm>
           <a:prstGeom prst="rect">
             <a:avLst/>
@@ -7774,7 +7574,7 @@
           <a:bodyPr/>
           <a:lstStyle/>
           <a:p>
-            <a:pPr marL="0" algn="ctr">
+            <a:pPr indent="0" algn="ctr">
               <a:lnSpc>
                 <a:spcPct val="90000"/>
               </a:lnSpc>
@@ -7793,7 +7593,7 @@
             </a:r>
           </a:p>
           <a:p>
-            <a:pPr marL="0" algn="ctr">
+            <a:pPr indent="0" algn="ctr">
               <a:lnSpc>
                 <a:spcPct val="90000"/>
               </a:lnSpc>
@@ -7812,7 +7612,7 @@
             </a:r>
           </a:p>
           <a:p>
-            <a:pPr marL="0" algn="ctr">
+            <a:pPr indent="0" algn="ctr">
               <a:lnSpc>
                 <a:spcPct val="90000"/>
               </a:lnSpc>
@@ -7860,7 +7660,7 @@
       </p:grpSpPr>
       <p:sp>
         <p:nvSpPr>
-          <p:cNvPr id="302" name="SOLID principles"/>
+          <p:cNvPr id="302" name="Objects versus functions"/>
           <p:cNvSpPr txBox="1"/>
           <p:nvPr>
             <p:ph type="title"/>
@@ -7877,14 +7677,14 @@
           <a:p>
             <a:pPr/>
             <a:r>
-              <a:t>SOLID principles</a:t>
-            </a:r>
-          </a:p>
-        </p:txBody>
-      </p:sp>
-      <p:sp>
-        <p:nvSpPr>
-          <p:cNvPr id="303" name="These follow from some of the previous points…"/>
+              <a:t>Objects versus functions</a:t>
+            </a:r>
+          </a:p>
+        </p:txBody>
+      </p:sp>
+      <p:sp>
+        <p:nvSpPr>
+          <p:cNvPr id="303" name="OOP is naturally geared for encapsulation.…"/>
           <p:cNvSpPr txBox="1"/>
           <p:nvPr>
             <p:ph type="body" idx="1"/>
@@ -7901,52 +7701,50 @@
           <a:p>
             <a:pPr/>
             <a:r>
-              <a:t>These follow from some of the previous points</a:t>
-            </a:r>
-          </a:p>
-          <a:p>
-            <a:pPr/>
-          </a:p>
-          <a:p>
-            <a:pPr/>
-            <a:r>
-              <a:t>Single Responsibility principle</a:t>
-            </a:r>
-          </a:p>
-          <a:p>
-            <a:pPr/>
-          </a:p>
-          <a:p>
-            <a:pPr/>
-            <a:r>
-              <a:t>Open for Extension, Closed for Modification</a:t>
-            </a:r>
-          </a:p>
-          <a:p>
-            <a:pPr/>
-          </a:p>
-          <a:p>
-            <a:pPr/>
-            <a:r>
-              <a:t>Lipskov Subsitution Principle</a:t>
-            </a:r>
-          </a:p>
-          <a:p>
-            <a:pPr/>
-          </a:p>
-          <a:p>
-            <a:pPr/>
-            <a:r>
-              <a:t>Interface Segregation</a:t>
-            </a:r>
-          </a:p>
-          <a:p>
-            <a:pPr/>
-          </a:p>
-          <a:p>
-            <a:pPr/>
-            <a:r>
-              <a:t>Dependency Inversion</a:t>
+              <a:t>OOP is naturally geared for encapsulation.</a:t>
+            </a:r>
+          </a:p>
+          <a:p>
+            <a:pPr lvl="1" marL="946150" indent="-368300">
+              <a:buChar char="►"/>
+            </a:pPr>
+            <a:r>
+              <a:t>Hide data</a:t>
+            </a:r>
+          </a:p>
+          <a:p>
+            <a:pPr lvl="1" marL="946150" indent="-368300">
+              <a:buChar char="►"/>
+            </a:pPr>
+            <a:r>
+              <a:t>Hide utility methods</a:t>
+            </a:r>
+          </a:p>
+          <a:p>
+            <a:pPr lvl="1" marL="946150" indent="-368300">
+              <a:buChar char="►"/>
+            </a:pPr>
+            <a:r>
+              <a:t>Expose only public methods</a:t>
+            </a:r>
+          </a:p>
+          <a:p>
+            <a:pPr lvl="1" marL="946150" indent="-368300">
+              <a:buChar char="►"/>
+            </a:pPr>
+          </a:p>
+          <a:p>
+            <a:pPr/>
+            <a:r>
+              <a:t>But functions can do something similar with inner methods.</a:t>
+            </a:r>
+          </a:p>
+          <a:p>
+            <a:pPr lvl="1" marL="946150" indent="-368300">
+              <a:buChar char="►"/>
+            </a:pPr>
+            <a:r>
+              <a:t>An inner method is defined ‘inside’ another function</a:t>
             </a:r>
           </a:p>
         </p:txBody>
@@ -7979,13 +7777,17 @@
       </p:grpSpPr>
       <p:sp>
         <p:nvSpPr>
-          <p:cNvPr id="305" name="Design Patterns"/>
+          <p:cNvPr id="305" name="Use Logging to save time debugging"/>
           <p:cNvSpPr txBox="1"/>
           <p:nvPr>
             <p:ph type="title"/>
           </p:nvPr>
         </p:nvSpPr>
         <p:spPr>
+          <a:xfrm>
+            <a:off x="1138914" y="714374"/>
+            <a:ext cx="7311109" cy="675058"/>
+          </a:xfrm>
           <a:prstGeom prst="rect">
             <a:avLst/>
           </a:prstGeom>
@@ -7996,20 +7798,24 @@
           <a:p>
             <a:pPr/>
             <a:r>
-              <a:t>Design Patterns</a:t>
-            </a:r>
-          </a:p>
-        </p:txBody>
-      </p:sp>
-      <p:sp>
-        <p:nvSpPr>
-          <p:cNvPr id="306" name="What is a design pattern…"/>
+              <a:t>Use Logging to save time debugging</a:t>
+            </a:r>
+          </a:p>
+        </p:txBody>
+      </p:sp>
+      <p:sp>
+        <p:nvSpPr>
+          <p:cNvPr id="306" name="Divide your output into…"/>
           <p:cNvSpPr txBox="1"/>
           <p:nvPr>
             <p:ph type="body" idx="1"/>
           </p:nvPr>
         </p:nvSpPr>
         <p:spPr>
+          <a:xfrm>
+            <a:off x="1138914" y="1312257"/>
+            <a:ext cx="7311109" cy="3528152"/>
+          </a:xfrm>
           <a:prstGeom prst="rect">
             <a:avLst/>
           </a:prstGeom>
@@ -8020,7 +7826,7 @@
           <a:p>
             <a:pPr/>
             <a:r>
-              <a:t>What is a design pattern</a:t>
+              <a:t>Divide your output into</a:t>
             </a:r>
           </a:p>
           <a:p>
@@ -8028,7 +7834,7 @@
               <a:buChar char="►"/>
             </a:pPr>
             <a:r>
-              <a:t>It is NOT always inheritance</a:t>
+              <a:t>High level status output</a:t>
             </a:r>
           </a:p>
           <a:p>
@@ -8036,33 +7842,42 @@
               <a:buChar char="►"/>
             </a:pPr>
             <a:r>
-              <a:t>It’s a reusable solution</a:t>
-            </a:r>
-          </a:p>
-          <a:p>
-            <a:pPr/>
-            <a:r>
-              <a:t>Example from biology</a:t>
+              <a:t>Low level details</a:t>
             </a:r>
           </a:p>
           <a:p>
             <a:pPr lvl="1" marL="946150" indent="-368300">
               <a:buChar char="►"/>
             </a:pPr>
-            <a:r>
-              <a:t>Birds have wings just like their dinosaur ancestors did, so it CAN be related to inheritance</a:t>
-            </a:r>
-          </a:p>
-          <a:p>
-            <a:pPr lvl="1" marL="946150" indent="-368300">
-              <a:buChar char="►"/>
-            </a:pPr>
-            <a:r>
-              <a:t>BUT, a much clearer example, </a:t>
-            </a:r>
-            <a:r>
-              <a:rPr b="1"/>
-              <a:t>why do both bats and birds have wings!?  </a:t>
+          </a:p>
+          <a:p>
+            <a:pPr/>
+            <a:r>
+              <a:t>Setting up logging is easy with python</a:t>
+            </a:r>
+          </a:p>
+          <a:p>
+            <a:pPr/>
+            <a:r>
+              <a:t>Use print for high level output</a:t>
+            </a:r>
+          </a:p>
+          <a:p>
+            <a:pPr/>
+            <a:r>
+              <a:t>Use logging or logging levels to a file</a:t>
+            </a:r>
+          </a:p>
+          <a:p>
+            <a:pPr/>
+            <a:r>
+              <a:t>You can always use `tail -f &lt;logname&gt;` to watch in real time</a:t>
+            </a:r>
+          </a:p>
+          <a:p>
+            <a:pPr/>
+            <a:r>
+              <a:t>Get as detailed as you need</a:t>
             </a:r>
           </a:p>
         </p:txBody>
@@ -8095,13 +7910,17 @@
       </p:grpSpPr>
       <p:sp>
         <p:nvSpPr>
-          <p:cNvPr id="308" name="30 foot overview of Design Pattern"/>
+          <p:cNvPr id="308" name="On a larger scale, partition your code"/>
           <p:cNvSpPr txBox="1"/>
           <p:nvPr>
             <p:ph type="title"/>
           </p:nvPr>
         </p:nvSpPr>
         <p:spPr>
+          <a:xfrm>
+            <a:off x="1138914" y="714374"/>
+            <a:ext cx="7311109" cy="675058"/>
+          </a:xfrm>
           <a:prstGeom prst="rect">
             <a:avLst/>
           </a:prstGeom>
@@ -8112,20 +7931,24 @@
           <a:p>
             <a:pPr/>
             <a:r>
-              <a:t>30 foot overview of Design Pattern</a:t>
-            </a:r>
-          </a:p>
-        </p:txBody>
-      </p:sp>
-      <p:sp>
-        <p:nvSpPr>
-          <p:cNvPr id="309" name="Template: You have a sequence of steps to apply, but the details vary per type of processing/calculation…"/>
+              <a:t>On a larger scale, partition your code</a:t>
+            </a:r>
+          </a:p>
+        </p:txBody>
+      </p:sp>
+      <p:sp>
+        <p:nvSpPr>
+          <p:cNvPr id="309" name="Organizing your code at a larger scale with directories and modules…"/>
           <p:cNvSpPr txBox="1"/>
           <p:nvPr>
             <p:ph type="body" idx="1"/>
           </p:nvPr>
         </p:nvSpPr>
         <p:spPr>
+          <a:xfrm>
+            <a:off x="1138914" y="1312257"/>
+            <a:ext cx="7311109" cy="3528152"/>
+          </a:xfrm>
           <a:prstGeom prst="rect">
             <a:avLst/>
           </a:prstGeom>
@@ -8136,6 +7959,390 @@
           <a:p>
             <a:pPr/>
             <a:r>
+              <a:t>Organizing your code at a larger scale with directories and modules</a:t>
+            </a:r>
+          </a:p>
+          <a:p>
+            <a:pPr/>
+            <a:r>
+              <a:t>Typical linux setup:</a:t>
+            </a:r>
+          </a:p>
+          <a:p>
+            <a:pPr lvl="1" marL="946150" indent="-368300">
+              <a:buChar char="►"/>
+            </a:pPr>
+            <a:r>
+              <a:t>bin - for ‘binary’, or executable functions, features</a:t>
+            </a:r>
+          </a:p>
+          <a:p>
+            <a:pPr lvl="1" marL="946150" indent="-368300">
+              <a:buChar char="►"/>
+            </a:pPr>
+            <a:r>
+              <a:t>lib - for `library`, or modules</a:t>
+            </a:r>
+          </a:p>
+          <a:p>
+            <a:pPr lvl="1" marL="946150" indent="-368300">
+              <a:buChar char="►"/>
+            </a:pPr>
+            <a:r>
+              <a:t>util - for shared `utilities`</a:t>
+            </a:r>
+          </a:p>
+          <a:p>
+            <a:pPr lvl="1" marL="946150" indent="-368300">
+              <a:buChar char="►"/>
+            </a:pPr>
+            <a:r>
+              <a:t>vendor - for external packages, (env is an example)</a:t>
+            </a:r>
+          </a:p>
+        </p:txBody>
+      </p:sp>
+    </p:spTree>
+  </p:cSld>
+  <p:clrMapOvr>
+    <a:masterClrMapping/>
+  </p:clrMapOvr>
+  <p:transition xmlns:p14="http://schemas.microsoft.com/office/powerpoint/2010/main" spd="med" advClick="1"/>
+</p:sld>
+</file>
+
+<file path=ppt/slides/slide13.xml><?xml version="1.0" encoding="utf-8"?>
+<p:sld xmlns:a="http://schemas.openxmlformats.org/drawingml/2006/main" xmlns:r="http://schemas.openxmlformats.org/officeDocument/2006/relationships" xmlns:p="http://schemas.openxmlformats.org/presentationml/2006/main" xmlns:m="http://schemas.openxmlformats.org/officeDocument/2006/math" xmlns:a14="http://schemas.microsoft.com/office/drawing/2010/main" showMasterSp="1" showMasterPhAnim="1">
+  <p:cSld>
+    <p:spTree>
+      <p:nvGrpSpPr>
+        <p:cNvPr id="1" name=""/>
+        <p:cNvGrpSpPr/>
+        <p:nvPr/>
+      </p:nvGrpSpPr>
+      <p:grpSpPr>
+        <a:xfrm>
+          <a:off x="0" y="0"/>
+          <a:ext cx="0" cy="0"/>
+          <a:chOff x="0" y="0"/>
+          <a:chExt cx="0" cy="0"/>
+        </a:xfrm>
+      </p:grpSpPr>
+      <p:sp>
+        <p:nvSpPr>
+          <p:cNvPr id="311" name="SOLID principles"/>
+          <p:cNvSpPr txBox="1"/>
+          <p:nvPr>
+            <p:ph type="title"/>
+          </p:nvPr>
+        </p:nvSpPr>
+        <p:spPr>
+          <a:xfrm>
+            <a:off x="1138914" y="714374"/>
+            <a:ext cx="7311109" cy="675058"/>
+          </a:xfrm>
+          <a:prstGeom prst="rect">
+            <a:avLst/>
+          </a:prstGeom>
+        </p:spPr>
+        <p:txBody>
+          <a:bodyPr/>
+          <a:lstStyle/>
+          <a:p>
+            <a:pPr/>
+            <a:r>
+              <a:t>SOLID principles</a:t>
+            </a:r>
+          </a:p>
+        </p:txBody>
+      </p:sp>
+      <p:sp>
+        <p:nvSpPr>
+          <p:cNvPr id="312" name="These follow from some of the previous points…"/>
+          <p:cNvSpPr txBox="1"/>
+          <p:nvPr>
+            <p:ph type="body" idx="1"/>
+          </p:nvPr>
+        </p:nvSpPr>
+        <p:spPr>
+          <a:xfrm>
+            <a:off x="1138914" y="1312257"/>
+            <a:ext cx="7311109" cy="3528152"/>
+          </a:xfrm>
+          <a:prstGeom prst="rect">
+            <a:avLst/>
+          </a:prstGeom>
+        </p:spPr>
+        <p:txBody>
+          <a:bodyPr/>
+          <a:lstStyle/>
+          <a:p>
+            <a:pPr/>
+            <a:r>
+              <a:t>These follow from some of the previous points</a:t>
+            </a:r>
+          </a:p>
+          <a:p>
+            <a:pPr/>
+          </a:p>
+          <a:p>
+            <a:pPr/>
+            <a:r>
+              <a:t>Single Responsibility principle</a:t>
+            </a:r>
+          </a:p>
+          <a:p>
+            <a:pPr/>
+          </a:p>
+          <a:p>
+            <a:pPr/>
+            <a:r>
+              <a:t>Open for Extension, Closed for Modification</a:t>
+            </a:r>
+          </a:p>
+          <a:p>
+            <a:pPr/>
+          </a:p>
+          <a:p>
+            <a:pPr/>
+            <a:r>
+              <a:t>Lipskov Subsitution Principle</a:t>
+            </a:r>
+          </a:p>
+          <a:p>
+            <a:pPr/>
+          </a:p>
+          <a:p>
+            <a:pPr/>
+            <a:r>
+              <a:t>Interface Segregation</a:t>
+            </a:r>
+          </a:p>
+          <a:p>
+            <a:pPr/>
+          </a:p>
+          <a:p>
+            <a:pPr/>
+            <a:r>
+              <a:t>Dependency Inversion</a:t>
+            </a:r>
+          </a:p>
+        </p:txBody>
+      </p:sp>
+    </p:spTree>
+  </p:cSld>
+  <p:clrMapOvr>
+    <a:masterClrMapping/>
+  </p:clrMapOvr>
+  <p:transition xmlns:p14="http://schemas.microsoft.com/office/powerpoint/2010/main" spd="med" advClick="1"/>
+</p:sld>
+</file>
+
+<file path=ppt/slides/slide14.xml><?xml version="1.0" encoding="utf-8"?>
+<p:sld xmlns:a="http://schemas.openxmlformats.org/drawingml/2006/main" xmlns:r="http://schemas.openxmlformats.org/officeDocument/2006/relationships" xmlns:p="http://schemas.openxmlformats.org/presentationml/2006/main" xmlns:m="http://schemas.openxmlformats.org/officeDocument/2006/math" xmlns:a14="http://schemas.microsoft.com/office/drawing/2010/main" showMasterSp="1" showMasterPhAnim="1">
+  <p:cSld>
+    <p:spTree>
+      <p:nvGrpSpPr>
+        <p:cNvPr id="1" name=""/>
+        <p:cNvGrpSpPr/>
+        <p:nvPr/>
+      </p:nvGrpSpPr>
+      <p:grpSpPr>
+        <a:xfrm>
+          <a:off x="0" y="0"/>
+          <a:ext cx="0" cy="0"/>
+          <a:chOff x="0" y="0"/>
+          <a:chExt cx="0" cy="0"/>
+        </a:xfrm>
+      </p:grpSpPr>
+      <p:sp>
+        <p:nvSpPr>
+          <p:cNvPr id="314" name="Design Patterns"/>
+          <p:cNvSpPr txBox="1"/>
+          <p:nvPr>
+            <p:ph type="title"/>
+          </p:nvPr>
+        </p:nvSpPr>
+        <p:spPr>
+          <a:xfrm>
+            <a:off x="1138914" y="714374"/>
+            <a:ext cx="7311109" cy="675058"/>
+          </a:xfrm>
+          <a:prstGeom prst="rect">
+            <a:avLst/>
+          </a:prstGeom>
+        </p:spPr>
+        <p:txBody>
+          <a:bodyPr/>
+          <a:lstStyle/>
+          <a:p>
+            <a:pPr/>
+            <a:r>
+              <a:t>Design Patterns</a:t>
+            </a:r>
+          </a:p>
+        </p:txBody>
+      </p:sp>
+      <p:sp>
+        <p:nvSpPr>
+          <p:cNvPr id="315" name="What is a design pattern…"/>
+          <p:cNvSpPr txBox="1"/>
+          <p:nvPr>
+            <p:ph type="body" idx="1"/>
+          </p:nvPr>
+        </p:nvSpPr>
+        <p:spPr>
+          <a:xfrm>
+            <a:off x="1138914" y="1312257"/>
+            <a:ext cx="7311109" cy="3528152"/>
+          </a:xfrm>
+          <a:prstGeom prst="rect">
+            <a:avLst/>
+          </a:prstGeom>
+        </p:spPr>
+        <p:txBody>
+          <a:bodyPr/>
+          <a:lstStyle/>
+          <a:p>
+            <a:pPr/>
+            <a:r>
+              <a:t>What is a design pattern</a:t>
+            </a:r>
+          </a:p>
+          <a:p>
+            <a:pPr lvl="1" marL="946150" indent="-368300">
+              <a:buChar char="►"/>
+            </a:pPr>
+            <a:r>
+              <a:t>It is NOT always inheritance</a:t>
+            </a:r>
+          </a:p>
+          <a:p>
+            <a:pPr lvl="1" marL="946150" indent="-368300">
+              <a:buChar char="►"/>
+            </a:pPr>
+            <a:r>
+              <a:t>It’s a reusable solution</a:t>
+            </a:r>
+          </a:p>
+          <a:p>
+            <a:pPr/>
+            <a:r>
+              <a:t>Example from biology</a:t>
+            </a:r>
+          </a:p>
+          <a:p>
+            <a:pPr lvl="1" marL="946150" indent="-368300">
+              <a:buChar char="►"/>
+            </a:pPr>
+            <a:r>
+              <a:t>Birds have wings just like their dinosaur ancestors did, so it CAN be related to inheritance</a:t>
+            </a:r>
+          </a:p>
+          <a:p>
+            <a:pPr lvl="1" marL="946150" indent="-368300">
+              <a:buChar char="►"/>
+            </a:pPr>
+            <a:r>
+              <a:t>BUT, a much clearer example, </a:t>
+            </a:r>
+            <a:r>
+              <a:rPr b="1"/>
+              <a:t>why do both bats and birds have wings!?  </a:t>
+            </a:r>
+            <a:endParaRPr b="1"/>
+          </a:p>
+          <a:p>
+            <a:pPr lvl="1" marL="946150" indent="-368300">
+              <a:buChar char="►"/>
+            </a:pPr>
+            <a:endParaRPr b="1"/>
+          </a:p>
+          <a:p>
+            <a:pPr/>
+            <a:r>
+              <a:t>It is NOT a cookie cutter approach though.  You must adapt a solution to the context.</a:t>
+            </a:r>
+          </a:p>
+        </p:txBody>
+      </p:sp>
+    </p:spTree>
+  </p:cSld>
+  <p:clrMapOvr>
+    <a:masterClrMapping/>
+  </p:clrMapOvr>
+  <p:transition xmlns:p14="http://schemas.microsoft.com/office/powerpoint/2010/main" spd="med" advClick="1"/>
+</p:sld>
+</file>
+
+<file path=ppt/slides/slide15.xml><?xml version="1.0" encoding="utf-8"?>
+<p:sld xmlns:a="http://schemas.openxmlformats.org/drawingml/2006/main" xmlns:r="http://schemas.openxmlformats.org/officeDocument/2006/relationships" xmlns:p="http://schemas.openxmlformats.org/presentationml/2006/main" xmlns:m="http://schemas.openxmlformats.org/officeDocument/2006/math" xmlns:a14="http://schemas.microsoft.com/office/drawing/2010/main" showMasterSp="1" showMasterPhAnim="1">
+  <p:cSld>
+    <p:spTree>
+      <p:nvGrpSpPr>
+        <p:cNvPr id="1" name=""/>
+        <p:cNvGrpSpPr/>
+        <p:nvPr/>
+      </p:nvGrpSpPr>
+      <p:grpSpPr>
+        <a:xfrm>
+          <a:off x="0" y="0"/>
+          <a:ext cx="0" cy="0"/>
+          <a:chOff x="0" y="0"/>
+          <a:chExt cx="0" cy="0"/>
+        </a:xfrm>
+      </p:grpSpPr>
+      <p:sp>
+        <p:nvSpPr>
+          <p:cNvPr id="317" name="30 foot overview of Design Pattern"/>
+          <p:cNvSpPr txBox="1"/>
+          <p:nvPr>
+            <p:ph type="title"/>
+          </p:nvPr>
+        </p:nvSpPr>
+        <p:spPr>
+          <a:xfrm>
+            <a:off x="1138914" y="714374"/>
+            <a:ext cx="7311109" cy="675058"/>
+          </a:xfrm>
+          <a:prstGeom prst="rect">
+            <a:avLst/>
+          </a:prstGeom>
+        </p:spPr>
+        <p:txBody>
+          <a:bodyPr/>
+          <a:lstStyle/>
+          <a:p>
+            <a:pPr/>
+            <a:r>
+              <a:t>30 foot overview of Design Pattern</a:t>
+            </a:r>
+          </a:p>
+        </p:txBody>
+      </p:sp>
+      <p:sp>
+        <p:nvSpPr>
+          <p:cNvPr id="318" name="Template: You have a sequence of steps to apply, but the details vary per type of processing/calculation…"/>
+          <p:cNvSpPr txBox="1"/>
+          <p:nvPr>
+            <p:ph type="body" idx="1"/>
+          </p:nvPr>
+        </p:nvSpPr>
+        <p:spPr>
+          <a:xfrm>
+            <a:off x="1138914" y="1312257"/>
+            <a:ext cx="7311109" cy="3528152"/>
+          </a:xfrm>
+          <a:prstGeom prst="rect">
+            <a:avLst/>
+          </a:prstGeom>
+        </p:spPr>
+        <p:txBody>
+          <a:bodyPr/>
+          <a:lstStyle/>
+          <a:p>
+            <a:pPr/>
+            <a:r>
               <a:t>Template: You have a sequence of steps to apply, but the details vary per type of processing/calculation</a:t>
             </a:r>
           </a:p>
@@ -8155,6 +8362,80 @@
             <a:pPr/>
             <a:r>
               <a:t>Proxy: When you want to replace an object whose internals vary wildly but it’s interface is the same, like a classifier</a:t>
+            </a:r>
+          </a:p>
+        </p:txBody>
+      </p:sp>
+    </p:spTree>
+  </p:cSld>
+  <p:clrMapOvr>
+    <a:masterClrMapping/>
+  </p:clrMapOvr>
+  <p:transition xmlns:p14="http://schemas.microsoft.com/office/powerpoint/2010/main" spd="med" advClick="1"/>
+</p:sld>
+</file>
+
+<file path=ppt/slides/slide16.xml><?xml version="1.0" encoding="utf-8"?>
+<p:sld xmlns:a="http://schemas.openxmlformats.org/drawingml/2006/main" xmlns:r="http://schemas.openxmlformats.org/officeDocument/2006/relationships" xmlns:p="http://schemas.openxmlformats.org/presentationml/2006/main" xmlns:m="http://schemas.openxmlformats.org/officeDocument/2006/math" xmlns:a14="http://schemas.microsoft.com/office/drawing/2010/main" showMasterSp="1" showMasterPhAnim="1">
+  <p:cSld>
+    <p:spTree>
+      <p:nvGrpSpPr>
+        <p:cNvPr id="1" name=""/>
+        <p:cNvGrpSpPr/>
+        <p:nvPr/>
+      </p:nvGrpSpPr>
+      <p:grpSpPr>
+        <a:xfrm>
+          <a:off x="0" y="0"/>
+          <a:ext cx="0" cy="0"/>
+          <a:chOff x="0" y="0"/>
+          <a:chExt cx="0" cy="0"/>
+        </a:xfrm>
+      </p:grpSpPr>
+      <p:sp>
+        <p:nvSpPr>
+          <p:cNvPr id="320" name="Other topics"/>
+          <p:cNvSpPr txBox="1"/>
+          <p:nvPr>
+            <p:ph type="title"/>
+          </p:nvPr>
+        </p:nvSpPr>
+        <p:spPr>
+          <a:prstGeom prst="rect">
+            <a:avLst/>
+          </a:prstGeom>
+        </p:spPr>
+        <p:txBody>
+          <a:bodyPr/>
+          <a:lstStyle/>
+          <a:p>
+            <a:pPr/>
+            <a:r>
+              <a:t>Other topics</a:t>
+            </a:r>
+          </a:p>
+        </p:txBody>
+      </p:sp>
+      <p:sp>
+        <p:nvSpPr>
+          <p:cNvPr id="321" name="Makefiles"/>
+          <p:cNvSpPr txBox="1"/>
+          <p:nvPr>
+            <p:ph type="body" idx="1"/>
+          </p:nvPr>
+        </p:nvSpPr>
+        <p:spPr>
+          <a:prstGeom prst="rect">
+            <a:avLst/>
+          </a:prstGeom>
+        </p:spPr>
+        <p:txBody>
+          <a:bodyPr/>
+          <a:lstStyle/>
+          <a:p>
+            <a:pPr/>
+            <a:r>
+              <a:t>Makefiles</a:t>
             </a:r>
           </a:p>
         </p:txBody>
@@ -8196,7 +8477,7 @@
         <p:spPr>
           <a:xfrm>
             <a:off x="1130976" y="690562"/>
-            <a:ext cx="7311109" cy="675058"/>
+            <a:ext cx="7311109" cy="675059"/>
           </a:xfrm>
           <a:prstGeom prst="rect">
             <a:avLst/>
@@ -8236,7 +8517,7 @@
         <p:spPr>
           <a:xfrm>
             <a:off x="729100" y="1369881"/>
-            <a:ext cx="7311000" cy="3599402"/>
+            <a:ext cx="7311000" cy="3599403"/>
           </a:xfrm>
           <a:prstGeom prst="rect">
             <a:avLst/>
@@ -8252,7 +8533,7 @@
               </a:lnSpc>
               <a:buSzTx/>
               <a:buNone/>
-              <a:defRPr sz="1368">
+              <a:defRPr sz="1300">
                 <a:solidFill>
                   <a:srgbClr val="000000"/>
                 </a:solidFill>
@@ -8277,7 +8558,7 @@
               <a:buSzPts val="1300"/>
               <a:buFont typeface="Arial"/>
               <a:buChar char="●"/>
-              <a:defRPr sz="1368">
+              <a:defRPr sz="1300">
                 <a:solidFill>
                   <a:srgbClr val="000000"/>
                 </a:solidFill>
@@ -8292,7 +8573,7 @@
             </a:r>
           </a:p>
           <a:p>
-            <a:pPr lvl="1" marL="632205" indent="-193039" defTabSz="694944">
+            <a:pPr lvl="1" marL="632205" indent="-193038" defTabSz="694944">
               <a:lnSpc>
                 <a:spcPct val="114998"/>
               </a:lnSpc>
@@ -8301,7 +8582,7 @@
               </a:spcBef>
               <a:buSzPts val="1300"/>
               <a:buFont typeface="Arial"/>
-              <a:defRPr sz="1368">
+              <a:defRPr sz="1300">
                 <a:solidFill>
                   <a:srgbClr val="000000"/>
                 </a:solidFill>
@@ -8316,7 +8597,7 @@
             </a:r>
           </a:p>
           <a:p>
-            <a:pPr lvl="1" marL="632205" indent="-193039" defTabSz="694944">
+            <a:pPr lvl="1" marL="632205" indent="-193038" defTabSz="694944">
               <a:lnSpc>
                 <a:spcPct val="114998"/>
               </a:lnSpc>
@@ -8325,7 +8606,7 @@
               </a:spcBef>
               <a:buSzPts val="1300"/>
               <a:buFont typeface="Arial"/>
-              <a:defRPr sz="1368">
+              <a:defRPr sz="1300">
                 <a:solidFill>
                   <a:srgbClr val="000000"/>
                 </a:solidFill>
@@ -8340,7 +8621,7 @@
             </a:r>
           </a:p>
           <a:p>
-            <a:pPr lvl="1" marL="632205" indent="-193039" defTabSz="694944">
+            <a:pPr lvl="1" marL="632205" indent="-193038" defTabSz="694944">
               <a:lnSpc>
                 <a:spcPct val="114998"/>
               </a:lnSpc>
@@ -8349,7 +8630,7 @@
               </a:spcBef>
               <a:buSzPts val="1300"/>
               <a:buFont typeface="Arial"/>
-              <a:defRPr sz="1368">
+              <a:defRPr sz="1300">
                 <a:solidFill>
                   <a:srgbClr val="000000"/>
                 </a:solidFill>
@@ -8374,7 +8655,7 @@
               <a:buSzPts val="1300"/>
               <a:buFont typeface="Arial"/>
               <a:buChar char="●"/>
-              <a:defRPr sz="1368">
+              <a:defRPr sz="1300">
                 <a:solidFill>
                   <a:srgbClr val="000000"/>
                 </a:solidFill>
@@ -8399,7 +8680,7 @@
               <a:buSzPts val="1300"/>
               <a:buFont typeface="Arial"/>
               <a:buChar char="●"/>
-              <a:defRPr sz="1368">
+              <a:defRPr sz="1300">
                 <a:solidFill>
                   <a:srgbClr val="000000"/>
                 </a:solidFill>
@@ -8424,7 +8705,7 @@
               <a:buSzPts val="1300"/>
               <a:buFont typeface="Arial"/>
               <a:buChar char="●"/>
-              <a:defRPr sz="1368">
+              <a:defRPr sz="1300">
                 <a:solidFill>
                   <a:srgbClr val="000000"/>
                 </a:solidFill>
@@ -8449,7 +8730,7 @@
               <a:buSzPts val="1300"/>
               <a:buFont typeface="Arial"/>
               <a:buChar char="●"/>
-              <a:defRPr sz="1368">
+              <a:defRPr sz="1300">
                 <a:solidFill>
                   <a:srgbClr val="000000"/>
                 </a:solidFill>
@@ -8474,7 +8755,7 @@
               <a:buSzPts val="1300"/>
               <a:buFont typeface="Arial"/>
               <a:buChar char="●"/>
-              <a:defRPr sz="1368">
+              <a:defRPr sz="1300">
                 <a:solidFill>
                   <a:srgbClr val="000000"/>
                 </a:solidFill>
@@ -8499,7 +8780,7 @@
               <a:buSzPts val="1300"/>
               <a:buFont typeface="Arial"/>
               <a:buChar char="●"/>
-              <a:defRPr sz="1368">
+              <a:defRPr sz="1300">
                 <a:solidFill>
                   <a:srgbClr val="000000"/>
                 </a:solidFill>
@@ -8514,7 +8795,7 @@
             </a:r>
           </a:p>
           <a:p>
-            <a:pPr lvl="1" marL="632205" indent="-193039" defTabSz="694944">
+            <a:pPr lvl="1" marL="632205" indent="-193038" defTabSz="694944">
               <a:lnSpc>
                 <a:spcPct val="114998"/>
               </a:lnSpc>
@@ -8523,7 +8804,7 @@
               </a:spcBef>
               <a:buSzPts val="1300"/>
               <a:buFont typeface="Arial"/>
-              <a:defRPr sz="1368">
+              <a:defRPr sz="1300">
                 <a:solidFill>
                   <a:srgbClr val="000000"/>
                 </a:solidFill>
@@ -8574,6 +8855,10 @@
           </p:nvPr>
         </p:nvSpPr>
         <p:spPr>
+          <a:xfrm>
+            <a:off x="1138914" y="714374"/>
+            <a:ext cx="7311109" cy="675058"/>
+          </a:xfrm>
           <a:prstGeom prst="rect">
             <a:avLst/>
           </a:prstGeom>
@@ -8598,6 +8883,10 @@
           </p:nvPr>
         </p:nvSpPr>
         <p:spPr>
+          <a:xfrm>
+            <a:off x="1138914" y="1221723"/>
+            <a:ext cx="7311109" cy="3528151"/>
+          </a:xfrm>
           <a:prstGeom prst="rect">
             <a:avLst/>
           </a:prstGeom>
@@ -8609,6 +8898,15 @@
             <a:pPr/>
             <a:r>
               <a:t>Any Code Of Your Own That You Haven't Looked At For Six Or More Months, Might As Well Have Been Written By Someone Else.</a:t>
+            </a:r>
+          </a:p>
+          <a:p>
+            <a:pPr/>
+          </a:p>
+          <a:p>
+            <a:pPr/>
+            <a:r>
+              <a:t>This is the long term view</a:t>
             </a:r>
           </a:p>
         </p:txBody>
@@ -8641,7 +8939,7 @@
       </p:grpSpPr>
       <p:sp>
         <p:nvSpPr>
-          <p:cNvPr id="284" name="Avoid single character names as in `for k,v in d`"/>
+          <p:cNvPr id="284" name="Cognitive Load"/>
           <p:cNvSpPr txBox="1"/>
           <p:nvPr>
             <p:ph type="title"/>
@@ -8654,22 +8952,18 @@
         </p:spPr>
         <p:txBody>
           <a:bodyPr/>
-          <a:lstStyle>
-            <a:lvl1pPr defTabSz="768095">
-              <a:defRPr sz="2520"/>
-            </a:lvl1pPr>
-          </a:lstStyle>
-          <a:p>
-            <a:pPr/>
-            <a:r>
-              <a:t>Avoid single character names as in `for k,v in d`</a:t>
-            </a:r>
-          </a:p>
-        </p:txBody>
-      </p:sp>
-      <p:sp>
-        <p:nvSpPr>
-          <p:cNvPr id="285" name="Searching for a variable is easier.…"/>
+          <a:lstStyle/>
+          <a:p>
+            <a:pPr/>
+            <a:r>
+              <a:t>Cognitive Load</a:t>
+            </a:r>
+          </a:p>
+        </p:txBody>
+      </p:sp>
+      <p:sp>
+        <p:nvSpPr>
+          <p:cNvPr id="285" name="Relates to the amount of information that working memory can hold at one time…"/>
           <p:cNvSpPr txBox="1"/>
           <p:nvPr>
             <p:ph type="body" idx="1"/>
@@ -8686,28 +8980,16 @@
           <a:p>
             <a:pPr/>
             <a:r>
-              <a:t>Searching for a variable is easier.  </a:t>
-            </a:r>
-          </a:p>
-          <a:p>
-            <a:pPr/>
-          </a:p>
-          <a:p>
-            <a:pPr/>
-          </a:p>
-          <a:p>
-            <a:pPr/>
-          </a:p>
-          <a:p>
-            <a:pPr/>
-          </a:p>
-          <a:p>
-            <a:pPr/>
-          </a:p>
-          <a:p>
-            <a:pPr/>
-            <a:r>
-              <a:t>Single character gives no hint of intent.</a:t>
+              <a:t>Relates to the amount of information that working memory can hold at one time</a:t>
+            </a:r>
+          </a:p>
+          <a:p>
+            <a:pPr/>
+          </a:p>
+          <a:p>
+            <a:pPr/>
+            <a:r>
+              <a:t>This is the ‘in the moment view’</a:t>
             </a:r>
           </a:p>
         </p:txBody>
@@ -8740,37 +9022,49 @@
       </p:grpSpPr>
       <p:sp>
         <p:nvSpPr>
-          <p:cNvPr id="287" name="Use function names over comments"/>
+          <p:cNvPr id="287" name="Avoid single character names as in `for k,v in d`"/>
           <p:cNvSpPr txBox="1"/>
           <p:nvPr>
             <p:ph type="title"/>
           </p:nvPr>
         </p:nvSpPr>
         <p:spPr>
+          <a:xfrm>
+            <a:off x="1138914" y="714374"/>
+            <a:ext cx="7311109" cy="675058"/>
+          </a:xfrm>
           <a:prstGeom prst="rect">
             <a:avLst/>
           </a:prstGeom>
         </p:spPr>
         <p:txBody>
           <a:bodyPr/>
-          <a:lstStyle/>
-          <a:p>
-            <a:pPr/>
-            <a:r>
-              <a:t>Use function names over comments</a:t>
-            </a:r>
-          </a:p>
-        </p:txBody>
-      </p:sp>
-      <p:sp>
-        <p:nvSpPr>
-          <p:cNvPr id="288" name="A regex wrapped in a proper function name is better for readability…"/>
+          <a:lstStyle>
+            <a:lvl1pPr defTabSz="768094">
+              <a:defRPr sz="2500"/>
+            </a:lvl1pPr>
+          </a:lstStyle>
+          <a:p>
+            <a:pPr/>
+            <a:r>
+              <a:t>Avoid single character names as in `for k,v in d`</a:t>
+            </a:r>
+          </a:p>
+        </p:txBody>
+      </p:sp>
+      <p:sp>
+        <p:nvSpPr>
+          <p:cNvPr id="288" name="Searching for a variable is easier.…"/>
           <p:cNvSpPr txBox="1"/>
           <p:nvPr>
             <p:ph type="body" idx="1"/>
           </p:nvPr>
         </p:nvSpPr>
         <p:spPr>
+          <a:xfrm>
+            <a:off x="1138914" y="1312257"/>
+            <a:ext cx="7311109" cy="3528152"/>
+          </a:xfrm>
           <a:prstGeom prst="rect">
             <a:avLst/>
           </a:prstGeom>
@@ -8781,34 +9075,28 @@
           <a:p>
             <a:pPr/>
             <a:r>
-              <a:t>A regex wrapped in a proper function name is better for readability</a:t>
-            </a:r>
-          </a:p>
-          <a:p>
-            <a:pPr/>
-          </a:p>
-          <a:p>
-            <a:pPr/>
-            <a:r>
-              <a:t>Cognitive load, remove the regex from visibility</a:t>
-            </a:r>
-          </a:p>
-          <a:p>
-            <a:pPr/>
-          </a:p>
-          <a:p>
-            <a:pPr/>
-            <a:r>
-              <a:t>Comments means you have to think about *2* places for meaning</a:t>
-            </a:r>
-          </a:p>
-          <a:p>
-            <a:pPr/>
-          </a:p>
-          <a:p>
-            <a:pPr/>
-            <a:r>
-              <a:t>Easier to test if you wrap in a function</a:t>
+              <a:t>Searching for a variable is easier.  </a:t>
+            </a:r>
+          </a:p>
+          <a:p>
+            <a:pPr/>
+          </a:p>
+          <a:p>
+            <a:pPr/>
+          </a:p>
+          <a:p>
+            <a:pPr/>
+          </a:p>
+          <a:p>
+            <a:pPr/>
+          </a:p>
+          <a:p>
+            <a:pPr/>
+          </a:p>
+          <a:p>
+            <a:pPr/>
+            <a:r>
+              <a:t>Single character gives no hint of intent.</a:t>
             </a:r>
           </a:p>
         </p:txBody>
@@ -8841,13 +9129,17 @@
       </p:grpSpPr>
       <p:sp>
         <p:nvSpPr>
-          <p:cNvPr id="290" name="Asserts aren’t just small tests…"/>
+          <p:cNvPr id="290" name="Use function names over comments"/>
           <p:cNvSpPr txBox="1"/>
           <p:nvPr>
             <p:ph type="title"/>
           </p:nvPr>
         </p:nvSpPr>
         <p:spPr>
+          <a:xfrm>
+            <a:off x="1138914" y="714374"/>
+            <a:ext cx="7311109" cy="675058"/>
+          </a:xfrm>
           <a:prstGeom prst="rect">
             <a:avLst/>
           </a:prstGeom>
@@ -8858,20 +9150,24 @@
           <a:p>
             <a:pPr/>
             <a:r>
-              <a:t>Asserts aren’t just small tests…</a:t>
-            </a:r>
-          </a:p>
-        </p:txBody>
-      </p:sp>
-      <p:sp>
-        <p:nvSpPr>
-          <p:cNvPr id="291" name="Documenting inputs and checking at the same time…"/>
+              <a:t>Use function names over comments</a:t>
+            </a:r>
+          </a:p>
+        </p:txBody>
+      </p:sp>
+      <p:sp>
+        <p:nvSpPr>
+          <p:cNvPr id="291" name="A regex wrapped in a proper function name is better for readability…"/>
           <p:cNvSpPr txBox="1"/>
           <p:nvPr>
             <p:ph type="body" idx="1"/>
           </p:nvPr>
         </p:nvSpPr>
         <p:spPr>
+          <a:xfrm>
+            <a:off x="1138914" y="1312257"/>
+            <a:ext cx="7311109" cy="3528152"/>
+          </a:xfrm>
           <a:prstGeom prst="rect">
             <a:avLst/>
           </a:prstGeom>
@@ -8881,47 +9177,35 @@
           <a:lstStyle/>
           <a:p>
             <a:pPr/>
-          </a:p>
-          <a:p>
-            <a:pPr/>
-            <a:r>
-              <a:t>Documenting inputs and checking at the same time</a:t>
-            </a:r>
-          </a:p>
-          <a:p>
-            <a:pPr/>
-          </a:p>
-          <a:p>
-            <a:pPr/>
-            <a:r>
-              <a:t>Asserting invariants (any condition that remains true/false)</a:t>
-            </a:r>
-          </a:p>
-          <a:p>
-            <a:pPr/>
-          </a:p>
-          <a:p>
-            <a:pPr/>
-            <a:r>
-              <a:t>Documenting outputs and checking at the same time</a:t>
-            </a:r>
-          </a:p>
-          <a:p>
-            <a:pPr/>
-          </a:p>
-          <a:p>
-            <a:pPr/>
-            <a:r>
-              <a:t>Reduce time debugging</a:t>
-            </a:r>
-          </a:p>
-          <a:p>
-            <a:pPr/>
-          </a:p>
-          <a:p>
-            <a:pPr/>
-            <a:r>
-              <a:t>Challenge yourself to use comments as last resort</a:t>
+            <a:r>
+              <a:t>A regex wrapped in a proper function name is better for readability</a:t>
+            </a:r>
+          </a:p>
+          <a:p>
+            <a:pPr/>
+          </a:p>
+          <a:p>
+            <a:pPr/>
+            <a:r>
+              <a:t>Cognitive load, remove the regex from visibility</a:t>
+            </a:r>
+          </a:p>
+          <a:p>
+            <a:pPr/>
+          </a:p>
+          <a:p>
+            <a:pPr/>
+            <a:r>
+              <a:t>Comments means you have to think about *2* places for meaning</a:t>
+            </a:r>
+          </a:p>
+          <a:p>
+            <a:pPr/>
+          </a:p>
+          <a:p>
+            <a:pPr/>
+            <a:r>
+              <a:t>Easier to test if you wrap in a function</a:t>
             </a:r>
           </a:p>
         </p:txBody>
@@ -8954,13 +9238,17 @@
       </p:grpSpPr>
       <p:sp>
         <p:nvSpPr>
-          <p:cNvPr id="293" name="Encapsulation - Divide and conquer"/>
+          <p:cNvPr id="293" name="Asserts aren’t just small tests…"/>
           <p:cNvSpPr txBox="1"/>
           <p:nvPr>
             <p:ph type="title"/>
           </p:nvPr>
         </p:nvSpPr>
         <p:spPr>
+          <a:xfrm>
+            <a:off x="1138914" y="714374"/>
+            <a:ext cx="7311109" cy="675058"/>
+          </a:xfrm>
           <a:prstGeom prst="rect">
             <a:avLst/>
           </a:prstGeom>
@@ -8971,20 +9259,24 @@
           <a:p>
             <a:pPr/>
             <a:r>
-              <a:t>Encapsulation - Divide and conquer</a:t>
-            </a:r>
-          </a:p>
-        </p:txBody>
-      </p:sp>
-      <p:sp>
-        <p:nvSpPr>
-          <p:cNvPr id="294" name="Reduce cognitive load by writing code in smaller pieces…"/>
+              <a:t>Asserts aren’t just small tests…</a:t>
+            </a:r>
+          </a:p>
+        </p:txBody>
+      </p:sp>
+      <p:sp>
+        <p:nvSpPr>
+          <p:cNvPr id="294" name="Documenting inputs and checking at the same time…"/>
           <p:cNvSpPr txBox="1"/>
           <p:nvPr>
             <p:ph type="body" idx="1"/>
           </p:nvPr>
         </p:nvSpPr>
         <p:spPr>
+          <a:xfrm>
+            <a:off x="1138914" y="1312257"/>
+            <a:ext cx="7311109" cy="3528152"/>
+          </a:xfrm>
           <a:prstGeom prst="rect">
             <a:avLst/>
           </a:prstGeom>
@@ -8994,26 +9286,47 @@
           <a:lstStyle/>
           <a:p>
             <a:pPr/>
-            <a:r>
-              <a:t>Reduce cognitive load by writing code in smaller pieces</a:t>
-            </a:r>
-          </a:p>
-          <a:p>
-            <a:pPr/>
-          </a:p>
-          <a:p>
-            <a:pPr/>
-            <a:r>
-              <a:t>Reuse code, keep your code *DRY* (Do not Repeat Yourself)</a:t>
-            </a:r>
-          </a:p>
-          <a:p>
-            <a:pPr/>
-          </a:p>
-          <a:p>
-            <a:pPr/>
-            <a:r>
-              <a:t>In combination with asserts, write once and move forward.</a:t>
+          </a:p>
+          <a:p>
+            <a:pPr/>
+            <a:r>
+              <a:t>Documenting inputs and checking at the same time</a:t>
+            </a:r>
+          </a:p>
+          <a:p>
+            <a:pPr/>
+          </a:p>
+          <a:p>
+            <a:pPr/>
+            <a:r>
+              <a:t>Asserting invariants (any condition that remains true/false)</a:t>
+            </a:r>
+          </a:p>
+          <a:p>
+            <a:pPr/>
+          </a:p>
+          <a:p>
+            <a:pPr/>
+            <a:r>
+              <a:t>Documenting outputs and checking at the same time</a:t>
+            </a:r>
+          </a:p>
+          <a:p>
+            <a:pPr/>
+          </a:p>
+          <a:p>
+            <a:pPr/>
+            <a:r>
+              <a:t>Reduce time debugging</a:t>
+            </a:r>
+          </a:p>
+          <a:p>
+            <a:pPr/>
+          </a:p>
+          <a:p>
+            <a:pPr/>
+            <a:r>
+              <a:t>Challenge yourself to use comments as last resort</a:t>
             </a:r>
           </a:p>
         </p:txBody>
@@ -9046,7 +9359,7 @@
       </p:grpSpPr>
       <p:sp>
         <p:nvSpPr>
-          <p:cNvPr id="296" name="Use Logging to save time debugging"/>
+          <p:cNvPr id="296" name="Assert versus Exception"/>
           <p:cNvSpPr txBox="1"/>
           <p:nvPr>
             <p:ph type="title"/>
@@ -9063,14 +9376,14 @@
           <a:p>
             <a:pPr/>
             <a:r>
-              <a:t>Use Logging to save time debugging</a:t>
-            </a:r>
-          </a:p>
-        </p:txBody>
-      </p:sp>
-      <p:sp>
-        <p:nvSpPr>
-          <p:cNvPr id="297" name="Divide your output into…"/>
+              <a:t>Assert versus Exception</a:t>
+            </a:r>
+          </a:p>
+        </p:txBody>
+      </p:sp>
+      <p:sp>
+        <p:nvSpPr>
+          <p:cNvPr id="297" name="An assert halts a program on failure.…"/>
           <p:cNvSpPr txBox="1"/>
           <p:nvPr>
             <p:ph type="body" idx="1"/>
@@ -9087,58 +9400,16 @@
           <a:p>
             <a:pPr/>
             <a:r>
-              <a:t>Divide your output into</a:t>
-            </a:r>
-          </a:p>
-          <a:p>
-            <a:pPr lvl="1" marL="946150" indent="-368300">
-              <a:buChar char="►"/>
-            </a:pPr>
-            <a:r>
-              <a:t>High level status output</a:t>
-            </a:r>
-          </a:p>
-          <a:p>
-            <a:pPr lvl="1" marL="946150" indent="-368300">
-              <a:buChar char="►"/>
-            </a:pPr>
-            <a:r>
-              <a:t>Low level details</a:t>
-            </a:r>
-          </a:p>
-          <a:p>
-            <a:pPr lvl="1" marL="946150" indent="-368300">
-              <a:buChar char="►"/>
-            </a:pPr>
-          </a:p>
-          <a:p>
-            <a:pPr/>
-            <a:r>
-              <a:t>Setting up logging is easy with python</a:t>
-            </a:r>
-          </a:p>
-          <a:p>
-            <a:pPr/>
-            <a:r>
-              <a:t>Use print for high level output</a:t>
-            </a:r>
-          </a:p>
-          <a:p>
-            <a:pPr/>
-            <a:r>
-              <a:t>Use logging or logging levels to a file</a:t>
-            </a:r>
-          </a:p>
-          <a:p>
-            <a:pPr/>
-            <a:r>
-              <a:t>You can always use `tail -f &lt;logname&gt;` to watch in real time</a:t>
-            </a:r>
-          </a:p>
-          <a:p>
-            <a:pPr/>
-            <a:r>
-              <a:t>Get as detailed as you need</a:t>
+              <a:t>An assert halts a program on failure.</a:t>
+            </a:r>
+          </a:p>
+          <a:p>
+            <a:pPr/>
+          </a:p>
+          <a:p>
+            <a:pPr/>
+            <a:r>
+              <a:t>If you want to recover, use a try/except block with an Exception</a:t>
             </a:r>
           </a:p>
         </p:txBody>
@@ -9171,13 +9442,17 @@
       </p:grpSpPr>
       <p:sp>
         <p:nvSpPr>
-          <p:cNvPr id="299" name="On a larger scale, partition your code"/>
+          <p:cNvPr id="299" name="Encapsulation - Divide and conquer"/>
           <p:cNvSpPr txBox="1"/>
           <p:nvPr>
             <p:ph type="title"/>
           </p:nvPr>
         </p:nvSpPr>
         <p:spPr>
+          <a:xfrm>
+            <a:off x="1138914" y="714374"/>
+            <a:ext cx="7311109" cy="675058"/>
+          </a:xfrm>
           <a:prstGeom prst="rect">
             <a:avLst/>
           </a:prstGeom>
@@ -9188,20 +9463,24 @@
           <a:p>
             <a:pPr/>
             <a:r>
-              <a:t>On a larger scale, partition your code</a:t>
-            </a:r>
-          </a:p>
-        </p:txBody>
-      </p:sp>
-      <p:sp>
-        <p:nvSpPr>
-          <p:cNvPr id="300" name="Organizing your code at a larger scale with directories and modules…"/>
+              <a:t>Encapsulation - Divide and conquer</a:t>
+            </a:r>
+          </a:p>
+        </p:txBody>
+      </p:sp>
+      <p:sp>
+        <p:nvSpPr>
+          <p:cNvPr id="300" name="Reduce cognitive load by writing code in smaller pieces…"/>
           <p:cNvSpPr txBox="1"/>
           <p:nvPr>
             <p:ph type="body" idx="1"/>
           </p:nvPr>
         </p:nvSpPr>
         <p:spPr>
+          <a:xfrm>
+            <a:off x="1138914" y="1312257"/>
+            <a:ext cx="7311109" cy="3528152"/>
+          </a:xfrm>
           <a:prstGeom prst="rect">
             <a:avLst/>
           </a:prstGeom>
@@ -9212,45 +9491,25 @@
           <a:p>
             <a:pPr/>
             <a:r>
-              <a:t>Organizing your code at a larger scale with directories and modules</a:t>
-            </a:r>
-          </a:p>
-          <a:p>
-            <a:pPr/>
-            <a:r>
-              <a:t>Typical linux setup:</a:t>
-            </a:r>
-          </a:p>
-          <a:p>
-            <a:pPr lvl="1" marL="946150" indent="-368300">
-              <a:buChar char="►"/>
-            </a:pPr>
-            <a:r>
-              <a:t>bin - for ‘binary’, or executable functions, features</a:t>
-            </a:r>
-          </a:p>
-          <a:p>
-            <a:pPr lvl="1" marL="946150" indent="-368300">
-              <a:buChar char="►"/>
-            </a:pPr>
-            <a:r>
-              <a:t>lib - for `library`, or modules</a:t>
-            </a:r>
-          </a:p>
-          <a:p>
-            <a:pPr lvl="1" marL="946150" indent="-368300">
-              <a:buChar char="►"/>
-            </a:pPr>
-            <a:r>
-              <a:t>util - for shared `utilities`</a:t>
-            </a:r>
-          </a:p>
-          <a:p>
-            <a:pPr lvl="1" marL="946150" indent="-368300">
-              <a:buChar char="►"/>
-            </a:pPr>
-            <a:r>
-              <a:t>vendor - for external packages, (env is an example)</a:t>
+              <a:t>Reduce cognitive load by writing code in smaller pieces</a:t>
+            </a:r>
+          </a:p>
+          <a:p>
+            <a:pPr/>
+          </a:p>
+          <a:p>
+            <a:pPr/>
+            <a:r>
+              <a:t>Reuse code, keep your code *DRY* (Do not Repeat Yourself)</a:t>
+            </a:r>
+          </a:p>
+          <a:p>
+            <a:pPr/>
+          </a:p>
+          <a:p>
+            <a:pPr/>
+            <a:r>
+              <a:t>In combination with asserts, write once and move forward.</a:t>
             </a:r>
           </a:p>
         </p:txBody>
@@ -9396,13 +9655,7 @@
           <a:effectLst/>
         </a:effectStyle>
         <a:effectStyle>
-          <a:effectLst>
-            <a:outerShdw sx="100000" sy="100000" kx="0" ky="0" algn="b" rotWithShape="0" blurRad="38100" dist="20000" dir="5400000">
-              <a:srgbClr val="000000">
-                <a:alpha val="38000"/>
-              </a:srgbClr>
-            </a:outerShdw>
-          </a:effectLst>
+          <a:effectLst/>
         </a:effectStyle>
       </a:effectStyleLst>
       <a:bgFillStyleLst>
@@ -9501,10 +9754,10 @@
             </a:solidFill>
             <a:effectLst/>
             <a:uFillTx/>
-            <a:latin typeface="+mj-lt"/>
-            <a:ea typeface="+mj-ea"/>
-            <a:cs typeface="+mj-cs"/>
-            <a:sym typeface="Arial"/>
+            <a:latin typeface="+mn-lt"/>
+            <a:ea typeface="+mn-ea"/>
+            <a:cs typeface="+mn-cs"/>
+            <a:sym typeface="Helvetica"/>
           </a:defRPr>
         </a:defPPr>
         <a:lvl1pPr marL="0" marR="0" indent="0" algn="l" defTabSz="914400" rtl="0" fontAlgn="auto" latinLnBrk="1" hangingPunct="0">
@@ -9759,13 +10012,7 @@
           <a:prstDash val="solid"/>
           <a:round/>
         </a:ln>
-        <a:effectLst>
-          <a:outerShdw sx="100000" sy="100000" kx="0" ky="0" algn="b" rotWithShape="0" blurRad="38100" dist="20000" dir="5400000">
-            <a:srgbClr val="000000">
-              <a:alpha val="38000"/>
-            </a:srgbClr>
-          </a:outerShdw>
-        </a:effectLst>
+        <a:effectLst/>
         <a:sp3d/>
       </a:spPr>
       <a:bodyPr rot="0" spcFirstLastPara="1" vertOverflow="overflow" horzOverflow="overflow" vert="horz" wrap="square" lIns="91439" tIns="45719" rIns="91439" bIns="45719" numCol="1" spcCol="38100" rtlCol="0" anchor="t" upright="0">
@@ -10078,10 +10325,10 @@
             </a:solidFill>
             <a:effectLst/>
             <a:uFillTx/>
-            <a:latin typeface="+mj-lt"/>
-            <a:ea typeface="+mj-ea"/>
-            <a:cs typeface="+mj-cs"/>
-            <a:sym typeface="Arial"/>
+            <a:latin typeface="+mn-lt"/>
+            <a:ea typeface="+mn-ea"/>
+            <a:cs typeface="+mn-cs"/>
+            <a:sym typeface="Helvetica"/>
           </a:defRPr>
         </a:defPPr>
         <a:lvl1pPr marL="0" marR="0" indent="0" algn="l" defTabSz="914400" rtl="0" fontAlgn="auto" latinLnBrk="1" hangingPunct="0">
@@ -10462,13 +10709,7 @@
           <a:effectLst/>
         </a:effectStyle>
         <a:effectStyle>
-          <a:effectLst>
-            <a:outerShdw sx="100000" sy="100000" kx="0" ky="0" algn="b" rotWithShape="0" blurRad="38100" dist="20000" dir="5400000">
-              <a:srgbClr val="000000">
-                <a:alpha val="38000"/>
-              </a:srgbClr>
-            </a:outerShdw>
-          </a:effectLst>
+          <a:effectLst/>
         </a:effectStyle>
       </a:effectStyleLst>
       <a:bgFillStyleLst>
@@ -10567,10 +10808,10 @@
             </a:solidFill>
             <a:effectLst/>
             <a:uFillTx/>
-            <a:latin typeface="+mj-lt"/>
-            <a:ea typeface="+mj-ea"/>
-            <a:cs typeface="+mj-cs"/>
-            <a:sym typeface="Arial"/>
+            <a:latin typeface="+mn-lt"/>
+            <a:ea typeface="+mn-ea"/>
+            <a:cs typeface="+mn-cs"/>
+            <a:sym typeface="Helvetica"/>
           </a:defRPr>
         </a:defPPr>
         <a:lvl1pPr marL="0" marR="0" indent="0" algn="l" defTabSz="914400" rtl="0" fontAlgn="auto" latinLnBrk="1" hangingPunct="0">
@@ -10825,13 +11066,7 @@
           <a:prstDash val="solid"/>
           <a:round/>
         </a:ln>
-        <a:effectLst>
-          <a:outerShdw sx="100000" sy="100000" kx="0" ky="0" algn="b" rotWithShape="0" blurRad="38100" dist="20000" dir="5400000">
-            <a:srgbClr val="000000">
-              <a:alpha val="38000"/>
-            </a:srgbClr>
-          </a:outerShdw>
-        </a:effectLst>
+        <a:effectLst/>
         <a:sp3d/>
       </a:spPr>
       <a:bodyPr rot="0" spcFirstLastPara="1" vertOverflow="overflow" horzOverflow="overflow" vert="horz" wrap="square" lIns="91439" tIns="45719" rIns="91439" bIns="45719" numCol="1" spcCol="38100" rtlCol="0" anchor="t" upright="0">
@@ -11144,10 +11379,10 @@
             </a:solidFill>
             <a:effectLst/>
             <a:uFillTx/>
-            <a:latin typeface="+mj-lt"/>
-            <a:ea typeface="+mj-ea"/>
-            <a:cs typeface="+mj-cs"/>
-            <a:sym typeface="Arial"/>
+            <a:latin typeface="+mn-lt"/>
+            <a:ea typeface="+mn-ea"/>
+            <a:cs typeface="+mn-cs"/>
+            <a:sym typeface="Helvetica"/>
           </a:defRPr>
         </a:defPPr>
         <a:lvl1pPr marL="0" marR="0" indent="0" algn="l" defTabSz="914400" rtl="0" fontAlgn="auto" latinLnBrk="1" hangingPunct="0">

</xml_diff>